<commit_message>
More work on SplayTree.
</commit_message>
<xml_diff>
--- a/SplayTree/SplayTrees.pptx
+++ b/SplayTree/SplayTrees.pptx
@@ -119,6 +119,11 @@
       </a:defRPr>
     </a:lvl9pPr>
   </p:defaultTextStyle>
+  <p:extLst>
+    <p:ext uri="{EFAFB233-063F-42B5-8137-9DF3F51BA10A}">
+      <p15:sldGuideLst xmlns:p15="http://schemas.microsoft.com/office/powerpoint/2012/main"/>
+    </p:ext>
+  </p:extLst>
 </p:presentation>
 </file>
 
@@ -4574,8 +4579,8 @@
         </p:nvSpPr>
         <p:spPr>
           <a:xfrm>
-            <a:off x="4165896" y="4458494"/>
-            <a:ext cx="2552494" cy="369332"/>
+            <a:off x="3971358" y="4731028"/>
+            <a:ext cx="3254417" cy="369332"/>
           </a:xfrm>
           <a:prstGeom prst="rect">
             <a:avLst/>
@@ -4589,8 +4594,22 @@
           <a:lstStyle/>
           <a:p>
             <a:r>
-              <a:rPr lang="en-US" dirty="0"/>
-              <a:t>Rotate Right (X raised) =&gt;</a:t>
+              <a:rPr lang="en-US" dirty="0" err="1">
+                <a:latin typeface="Consolas" panose="020B0609020204030204" pitchFamily="49" charset="0"/>
+                <a:cs typeface="Consolas" panose="020B0609020204030204" pitchFamily="49" charset="0"/>
+              </a:rPr>
+              <a:t>tree.rotate_right</a:t>
+            </a:r>
+            <a:r>
+              <a:rPr lang="en-US" dirty="0">
+                <a:latin typeface="Consolas" panose="020B0609020204030204" pitchFamily="49" charset="0"/>
+                <a:cs typeface="Consolas" panose="020B0609020204030204" pitchFamily="49" charset="0"/>
+              </a:rPr>
+              <a:t>( y )</a:t>
+            </a:r>
+            <a:r>
+              <a:rPr lang="en-US" dirty="0"/>
+              <a:t> =&gt;</a:t>
             </a:r>
           </a:p>
         </p:txBody>
@@ -4609,8 +4628,8 @@
         </p:nvSpPr>
         <p:spPr>
           <a:xfrm>
-            <a:off x="4232388" y="4915694"/>
-            <a:ext cx="2419509" cy="369332"/>
+            <a:off x="3664909" y="4401354"/>
+            <a:ext cx="3127779" cy="369332"/>
           </a:xfrm>
           <a:prstGeom prst="rect">
             <a:avLst/>
@@ -4625,7 +4644,21 @@
           <a:p>
             <a:r>
               <a:rPr lang="en-US" dirty="0"/>
-              <a:t>&lt;= Rotate Left (Y raised)</a:t>
+              <a:t>&lt;= </a:t>
+            </a:r>
+            <a:r>
+              <a:rPr lang="en-US" dirty="0" err="1">
+                <a:latin typeface="Consolas" panose="020B0609020204030204" pitchFamily="49" charset="0"/>
+                <a:cs typeface="Consolas" panose="020B0609020204030204" pitchFamily="49" charset="0"/>
+              </a:rPr>
+              <a:t>tree.rotate_left</a:t>
+            </a:r>
+            <a:r>
+              <a:rPr lang="en-US" dirty="0">
+                <a:latin typeface="Consolas" panose="020B0609020204030204" pitchFamily="49" charset="0"/>
+                <a:cs typeface="Consolas" panose="020B0609020204030204" pitchFamily="49" charset="0"/>
+              </a:rPr>
+              <a:t>( x )</a:t>
             </a:r>
           </a:p>
         </p:txBody>

</xml_diff>

<commit_message>
Cleaned up and extended the presentation on splay trees.
</commit_message>
<xml_diff>
--- a/SplayTree/SplayTrees.pptx
+++ b/SplayTree/SplayTrees.pptx
@@ -21,6 +21,9 @@
     <p:sldId id="270" r:id="rId15"/>
     <p:sldId id="268" r:id="rId16"/>
     <p:sldId id="271" r:id="rId17"/>
+    <p:sldId id="272" r:id="rId18"/>
+    <p:sldId id="273" r:id="rId19"/>
+    <p:sldId id="274" r:id="rId20"/>
   </p:sldIdLst>
   <p:sldSz cx="12192000" cy="6858000"/>
   <p:notesSz cx="6858000" cy="9144000"/>
@@ -274,7 +277,7 @@
           <a:p>
             <a:fld id="{531C5E8B-99A0-3C49-903D-B96D78C70B9F}" type="datetimeFigureOut">
               <a:rPr lang="en-US" smtClean="0"/>
-              <a:t>11/6/23</a:t>
+              <a:t>11/8/23</a:t>
             </a:fld>
             <a:endParaRPr lang="en-US"/>
           </a:p>
@@ -472,7 +475,7 @@
           <a:p>
             <a:fld id="{531C5E8B-99A0-3C49-903D-B96D78C70B9F}" type="datetimeFigureOut">
               <a:rPr lang="en-US" smtClean="0"/>
-              <a:t>11/6/23</a:t>
+              <a:t>11/8/23</a:t>
             </a:fld>
             <a:endParaRPr lang="en-US"/>
           </a:p>
@@ -680,7 +683,7 @@
           <a:p>
             <a:fld id="{531C5E8B-99A0-3C49-903D-B96D78C70B9F}" type="datetimeFigureOut">
               <a:rPr lang="en-US" smtClean="0"/>
-              <a:t>11/6/23</a:t>
+              <a:t>11/8/23</a:t>
             </a:fld>
             <a:endParaRPr lang="en-US"/>
           </a:p>
@@ -878,7 +881,7 @@
           <a:p>
             <a:fld id="{531C5E8B-99A0-3C49-903D-B96D78C70B9F}" type="datetimeFigureOut">
               <a:rPr lang="en-US" smtClean="0"/>
-              <a:t>11/6/23</a:t>
+              <a:t>11/8/23</a:t>
             </a:fld>
             <a:endParaRPr lang="en-US"/>
           </a:p>
@@ -1153,7 +1156,7 @@
           <a:p>
             <a:fld id="{531C5E8B-99A0-3C49-903D-B96D78C70B9F}" type="datetimeFigureOut">
               <a:rPr lang="en-US" smtClean="0"/>
-              <a:t>11/6/23</a:t>
+              <a:t>11/8/23</a:t>
             </a:fld>
             <a:endParaRPr lang="en-US"/>
           </a:p>
@@ -1418,7 +1421,7 @@
           <a:p>
             <a:fld id="{531C5E8B-99A0-3C49-903D-B96D78C70B9F}" type="datetimeFigureOut">
               <a:rPr lang="en-US" smtClean="0"/>
-              <a:t>11/6/23</a:t>
+              <a:t>11/8/23</a:t>
             </a:fld>
             <a:endParaRPr lang="en-US"/>
           </a:p>
@@ -1830,7 +1833,7 @@
           <a:p>
             <a:fld id="{531C5E8B-99A0-3C49-903D-B96D78C70B9F}" type="datetimeFigureOut">
               <a:rPr lang="en-US" smtClean="0"/>
-              <a:t>11/6/23</a:t>
+              <a:t>11/8/23</a:t>
             </a:fld>
             <a:endParaRPr lang="en-US"/>
           </a:p>
@@ -1971,7 +1974,7 @@
           <a:p>
             <a:fld id="{531C5E8B-99A0-3C49-903D-B96D78C70B9F}" type="datetimeFigureOut">
               <a:rPr lang="en-US" smtClean="0"/>
-              <a:t>11/6/23</a:t>
+              <a:t>11/8/23</a:t>
             </a:fld>
             <a:endParaRPr lang="en-US"/>
           </a:p>
@@ -2084,7 +2087,7 @@
           <a:p>
             <a:fld id="{531C5E8B-99A0-3C49-903D-B96D78C70B9F}" type="datetimeFigureOut">
               <a:rPr lang="en-US" smtClean="0"/>
-              <a:t>11/6/23</a:t>
+              <a:t>11/8/23</a:t>
             </a:fld>
             <a:endParaRPr lang="en-US"/>
           </a:p>
@@ -2395,7 +2398,7 @@
           <a:p>
             <a:fld id="{531C5E8B-99A0-3C49-903D-B96D78C70B9F}" type="datetimeFigureOut">
               <a:rPr lang="en-US" smtClean="0"/>
-              <a:t>11/6/23</a:t>
+              <a:t>11/8/23</a:t>
             </a:fld>
             <a:endParaRPr lang="en-US"/>
           </a:p>
@@ -2683,7 +2686,7 @@
           <a:p>
             <a:fld id="{531C5E8B-99A0-3C49-903D-B96D78C70B9F}" type="datetimeFigureOut">
               <a:rPr lang="en-US" smtClean="0"/>
-              <a:t>11/6/23</a:t>
+              <a:t>11/8/23</a:t>
             </a:fld>
             <a:endParaRPr lang="en-US"/>
           </a:p>
@@ -2924,7 +2927,7 @@
           <a:p>
             <a:fld id="{531C5E8B-99A0-3C49-903D-B96D78C70B9F}" type="datetimeFigureOut">
               <a:rPr lang="en-US" smtClean="0"/>
-              <a:t>11/6/23</a:t>
+              <a:t>11/8/23</a:t>
             </a:fld>
             <a:endParaRPr lang="en-US"/>
           </a:p>
@@ -3462,7 +3465,7 @@
           <a:p>
             <a:r>
               <a:rPr lang="en-US" dirty="0"/>
-              <a:t>What To Do?</a:t>
+              <a:t>What To Do? Here’s An Idea:</a:t>
             </a:r>
           </a:p>
         </p:txBody>
@@ -3490,7 +3493,7 @@
           <a:p>
             <a:r>
               <a:rPr lang="en-US" dirty="0"/>
-              <a:t>Idea: After each insert operation, do extra work to rebalance the tree!</a:t>
+              <a:t>After each insert operation, do extra work to rebalance the tree!</a:t>
             </a:r>
           </a:p>
           <a:p>
@@ -3719,14 +3722,14 @@
             <a:pPr lvl="1"/>
             <a:r>
               <a:rPr lang="en-US" dirty="0"/>
-              <a:t>Thus, after each look up, the item is brought to the root and the tree is “splayed” to flatten it somewhat.</a:t>
+              <a:t>After each find, the item is brought to the root, and the tree is “splayed” to flatten it (somewhat).</a:t>
             </a:r>
           </a:p>
           <a:p>
             <a:pPr lvl="1"/>
             <a:r>
               <a:rPr lang="en-US" dirty="0"/>
-              <a:t>Yes, looking up a deep item will be slow, but the flattening process will push the tree toward being balanced on average.</a:t>
+              <a:t>Looking up a deep item might be slow, but the flattening process will push the tree toward being balanced on average.</a:t>
             </a:r>
           </a:p>
         </p:txBody>
@@ -3933,7 +3936,7 @@
         </p:nvSpPr>
         <p:spPr>
           <a:xfrm>
-            <a:off x="8338457" y="4001294"/>
+            <a:off x="8198771" y="4001294"/>
             <a:ext cx="914400" cy="914400"/>
           </a:xfrm>
           <a:prstGeom prst="ellipse">
@@ -4171,7 +4174,7 @@
         </p:nvSpPr>
         <p:spPr>
           <a:xfrm>
-            <a:off x="7917212" y="5225143"/>
+            <a:off x="7846081" y="5225143"/>
             <a:ext cx="309700" cy="369332"/>
           </a:xfrm>
           <a:prstGeom prst="rect">
@@ -4206,7 +4209,7 @@
         </p:nvSpPr>
         <p:spPr>
           <a:xfrm>
-            <a:off x="9405257" y="5225143"/>
+            <a:off x="9204193" y="5225143"/>
             <a:ext cx="308098" cy="369332"/>
           </a:xfrm>
           <a:prstGeom prst="rect">
@@ -4415,7 +4418,7 @@
         <p:spPr>
           <a:xfrm>
             <a:off x="7464318" y="3480147"/>
-            <a:ext cx="1008050" cy="655058"/>
+            <a:ext cx="868364" cy="655058"/>
           </a:xfrm>
           <a:prstGeom prst="straightConnector1">
             <a:avLst/>
@@ -4498,8 +4501,8 @@
         </p:nvCxnSpPr>
         <p:spPr>
           <a:xfrm flipH="1">
-            <a:off x="8072062" y="4781783"/>
-            <a:ext cx="400306" cy="443360"/>
+            <a:off x="8000931" y="4781783"/>
+            <a:ext cx="331751" cy="443360"/>
           </a:xfrm>
           <a:prstGeom prst="straightConnector1">
             <a:avLst/>
@@ -4540,8 +4543,8 @@
         </p:nvCxnSpPr>
         <p:spPr>
           <a:xfrm>
-            <a:off x="9118946" y="4781783"/>
-            <a:ext cx="440360" cy="443360"/>
+            <a:off x="8979260" y="4781783"/>
+            <a:ext cx="378982" cy="443360"/>
           </a:xfrm>
           <a:prstGeom prst="straightConnector1">
             <a:avLst/>
@@ -4784,7 +4787,7 @@
         </p:nvSpPr>
         <p:spPr>
           <a:xfrm>
-            <a:off x="2786743" y="4539344"/>
+            <a:off x="2679011" y="4232075"/>
             <a:ext cx="914400" cy="914400"/>
           </a:xfrm>
           <a:prstGeom prst="ellipse">
@@ -4833,7 +4836,7 @@
         </p:nvSpPr>
         <p:spPr>
           <a:xfrm>
-            <a:off x="1611088" y="3142569"/>
+            <a:off x="1407541" y="2895600"/>
             <a:ext cx="914400" cy="914400"/>
           </a:xfrm>
           <a:prstGeom prst="ellipse">
@@ -4882,7 +4885,7 @@
         </p:nvSpPr>
         <p:spPr>
           <a:xfrm>
-            <a:off x="6640286" y="2895600"/>
+            <a:off x="6617009" y="2982166"/>
             <a:ext cx="914400" cy="914400"/>
           </a:xfrm>
           <a:prstGeom prst="ellipse">
@@ -4931,7 +4934,7 @@
         </p:nvSpPr>
         <p:spPr>
           <a:xfrm>
-            <a:off x="9546771" y="2971800"/>
+            <a:off x="9537807" y="2982166"/>
             <a:ext cx="914400" cy="914400"/>
           </a:xfrm>
           <a:prstGeom prst="ellipse">
@@ -5027,13 +5030,14 @@
           <p:cNvCxnSpPr>
             <a:cxnSpLocks/>
             <a:stCxn id="3" idx="3"/>
+            <a:endCxn id="5" idx="7"/>
           </p:cNvCxnSpPr>
           <p:nvPr/>
         </p:nvCxnSpPr>
         <p:spPr>
           <a:xfrm flipH="1">
-            <a:off x="2286000" y="2471177"/>
-            <a:ext cx="514912" cy="698387"/>
+            <a:off x="2188030" y="2471177"/>
+            <a:ext cx="612882" cy="558334"/>
           </a:xfrm>
           <a:prstGeom prst="straightConnector1">
             <a:avLst/>
@@ -5067,6 +5071,7 @@
             </a:extLst>
           </p:cNvPr>
           <p:cNvCxnSpPr>
+            <a:cxnSpLocks/>
             <a:stCxn id="5" idx="5"/>
             <a:endCxn id="4" idx="1"/>
           </p:cNvCxnSpPr>
@@ -5074,8 +5079,8 @@
         </p:nvCxnSpPr>
         <p:spPr>
           <a:xfrm>
-            <a:off x="2391577" y="3923058"/>
-            <a:ext cx="529077" cy="750197"/>
+            <a:off x="2188030" y="3676089"/>
+            <a:ext cx="624892" cy="689897"/>
           </a:xfrm>
           <a:prstGeom prst="straightConnector1">
             <a:avLst/>
@@ -5109,6 +5114,7 @@
             </a:extLst>
           </p:cNvPr>
           <p:cNvCxnSpPr>
+            <a:cxnSpLocks/>
             <a:stCxn id="8" idx="3"/>
             <a:endCxn id="6" idx="7"/>
           </p:cNvCxnSpPr>
@@ -5116,8 +5122,8 @@
         </p:nvCxnSpPr>
         <p:spPr>
           <a:xfrm flipH="1">
-            <a:off x="7420775" y="2424231"/>
-            <a:ext cx="746793" cy="605280"/>
+            <a:off x="7397498" y="2424231"/>
+            <a:ext cx="770070" cy="691846"/>
           </a:xfrm>
           <a:prstGeom prst="straightConnector1">
             <a:avLst/>
@@ -5159,7 +5165,7 @@
         <p:spPr>
           <a:xfrm>
             <a:off x="8814146" y="2424231"/>
-            <a:ext cx="866536" cy="681480"/>
+            <a:ext cx="857572" cy="691846"/>
           </a:xfrm>
           <a:prstGeom prst="straightConnector1">
             <a:avLst/>
@@ -5197,7 +5203,7 @@
         </p:nvSpPr>
         <p:spPr>
           <a:xfrm>
-            <a:off x="1132292" y="4229048"/>
+            <a:off x="970368" y="4056969"/>
             <a:ext cx="317716" cy="369332"/>
           </a:xfrm>
           <a:prstGeom prst="rect">
@@ -5232,7 +5238,7 @@
         </p:nvSpPr>
         <p:spPr>
           <a:xfrm>
-            <a:off x="2391578" y="5725495"/>
+            <a:off x="2321941" y="5436987"/>
             <a:ext cx="309700" cy="369332"/>
           </a:xfrm>
           <a:prstGeom prst="rect">
@@ -5267,7 +5273,7 @@
         </p:nvSpPr>
         <p:spPr>
           <a:xfrm>
-            <a:off x="3754686" y="5725495"/>
+            <a:off x="3581401" y="5436987"/>
             <a:ext cx="308098" cy="369332"/>
           </a:xfrm>
           <a:prstGeom prst="rect">
@@ -5337,7 +5343,7 @@
         </p:nvSpPr>
         <p:spPr>
           <a:xfrm>
-            <a:off x="6192897" y="4056969"/>
+            <a:off x="6300569" y="4181320"/>
             <a:ext cx="317716" cy="369332"/>
           </a:xfrm>
           <a:prstGeom prst="rect">
@@ -5372,7 +5378,7 @@
         </p:nvSpPr>
         <p:spPr>
           <a:xfrm>
-            <a:off x="7639321" y="4076053"/>
+            <a:off x="7527479" y="4181320"/>
             <a:ext cx="309700" cy="369332"/>
           </a:xfrm>
           <a:prstGeom prst="rect">
@@ -5407,7 +5413,7 @@
         </p:nvSpPr>
         <p:spPr>
           <a:xfrm>
-            <a:off x="9077729" y="4050488"/>
+            <a:off x="9228107" y="4181320"/>
             <a:ext cx="309700" cy="369332"/>
           </a:xfrm>
           <a:prstGeom prst="rect">
@@ -5442,7 +5448,7 @@
         </p:nvSpPr>
         <p:spPr>
           <a:xfrm>
-            <a:off x="10580912" y="4047409"/>
+            <a:off x="10490594" y="4181320"/>
             <a:ext cx="327334" cy="369332"/>
           </a:xfrm>
           <a:prstGeom prst="rect">
@@ -5522,8 +5528,8 @@
         </p:nvCxnSpPr>
         <p:spPr>
           <a:xfrm flipH="1">
-            <a:off x="1291150" y="3923058"/>
-            <a:ext cx="453849" cy="305990"/>
+            <a:off x="1129226" y="3676089"/>
+            <a:ext cx="412226" cy="380880"/>
           </a:xfrm>
           <a:prstGeom prst="straightConnector1">
             <a:avLst/>
@@ -5564,8 +5570,8 @@
         </p:nvCxnSpPr>
         <p:spPr>
           <a:xfrm flipH="1">
-            <a:off x="2546428" y="5319833"/>
-            <a:ext cx="374226" cy="405662"/>
+            <a:off x="2476791" y="5012564"/>
+            <a:ext cx="336131" cy="424423"/>
           </a:xfrm>
           <a:prstGeom prst="straightConnector1">
             <a:avLst/>
@@ -5606,8 +5612,8 @@
         </p:nvCxnSpPr>
         <p:spPr>
           <a:xfrm>
-            <a:off x="3567232" y="5319833"/>
-            <a:ext cx="341503" cy="405662"/>
+            <a:off x="3459500" y="5012564"/>
+            <a:ext cx="275950" cy="424423"/>
           </a:xfrm>
           <a:prstGeom prst="straightConnector1">
             <a:avLst/>
@@ -5648,8 +5654,8 @@
         </p:nvCxnSpPr>
         <p:spPr>
           <a:xfrm flipH="1">
-            <a:off x="6351755" y="3676089"/>
-            <a:ext cx="422442" cy="380880"/>
+            <a:off x="6459427" y="3762655"/>
+            <a:ext cx="291493" cy="418665"/>
           </a:xfrm>
           <a:prstGeom prst="straightConnector1">
             <a:avLst/>
@@ -5690,8 +5696,8 @@
         </p:nvCxnSpPr>
         <p:spPr>
           <a:xfrm>
-            <a:off x="7420775" y="3676089"/>
-            <a:ext cx="373396" cy="399964"/>
+            <a:off x="7397498" y="3762655"/>
+            <a:ext cx="284831" cy="418665"/>
           </a:xfrm>
           <a:prstGeom prst="straightConnector1">
             <a:avLst/>
@@ -5732,8 +5738,8 @@
         </p:nvCxnSpPr>
         <p:spPr>
           <a:xfrm flipH="1">
-            <a:off x="9232579" y="3752289"/>
-            <a:ext cx="448103" cy="298199"/>
+            <a:off x="9382957" y="3762655"/>
+            <a:ext cx="288761" cy="418665"/>
           </a:xfrm>
           <a:prstGeom prst="straightConnector1">
             <a:avLst/>
@@ -5767,6 +5773,7 @@
             </a:extLst>
           </p:cNvPr>
           <p:cNvCxnSpPr>
+            <a:cxnSpLocks/>
             <a:stCxn id="7" idx="5"/>
             <a:endCxn id="25" idx="0"/>
           </p:cNvCxnSpPr>
@@ -5774,8 +5781,8 @@
         </p:nvCxnSpPr>
         <p:spPr>
           <a:xfrm>
-            <a:off x="10327260" y="3752289"/>
-            <a:ext cx="417319" cy="295120"/>
+            <a:off x="10318296" y="3762655"/>
+            <a:ext cx="335965" cy="418665"/>
           </a:xfrm>
           <a:prstGeom prst="straightConnector1">
             <a:avLst/>
@@ -5814,7 +5821,7 @@
         <p:spPr>
           <a:xfrm>
             <a:off x="4555313" y="4995265"/>
-            <a:ext cx="5439694" cy="646331"/>
+            <a:ext cx="5630196" cy="646331"/>
           </a:xfrm>
           <a:prstGeom prst="rect">
             <a:avLst/>
@@ -5835,7 +5842,7 @@
           <a:p>
             <a:r>
               <a:rPr lang="en-US" dirty="0"/>
-              <a:t>Also, there is a mirror-image version.</a:t>
+              <a:t>There is also a mirror-image.</a:t>
             </a:r>
           </a:p>
         </p:txBody>
@@ -5854,7 +5861,7 @@
         </p:nvSpPr>
         <p:spPr>
           <a:xfrm>
-            <a:off x="4264919" y="3923058"/>
+            <a:off x="4536463" y="3013501"/>
             <a:ext cx="742511" cy="830997"/>
           </a:xfrm>
           <a:prstGeom prst="rect">
@@ -5947,7 +5954,7 @@
         </p:nvSpPr>
         <p:spPr>
           <a:xfrm>
-            <a:off x="3080657" y="1912143"/>
+            <a:off x="3537857" y="1866022"/>
             <a:ext cx="914400" cy="914400"/>
           </a:xfrm>
           <a:prstGeom prst="ellipse">
@@ -5996,7 +6003,7 @@
         </p:nvSpPr>
         <p:spPr>
           <a:xfrm>
-            <a:off x="2166257" y="3418114"/>
+            <a:off x="2340429" y="3067703"/>
             <a:ext cx="914400" cy="914400"/>
           </a:xfrm>
           <a:prstGeom prst="ellipse">
@@ -6045,7 +6052,7 @@
         </p:nvSpPr>
         <p:spPr>
           <a:xfrm>
-            <a:off x="1251857" y="4898570"/>
+            <a:off x="1163829" y="4297279"/>
             <a:ext cx="914400" cy="914400"/>
           </a:xfrm>
           <a:prstGeom prst="ellipse">
@@ -6094,7 +6101,7 @@
         </p:nvSpPr>
         <p:spPr>
           <a:xfrm>
-            <a:off x="9622971" y="5029199"/>
+            <a:off x="9929684" y="4297279"/>
             <a:ext cx="914400" cy="914400"/>
           </a:xfrm>
           <a:prstGeom prst="ellipse">
@@ -6143,7 +6150,7 @@
         </p:nvSpPr>
         <p:spPr>
           <a:xfrm>
-            <a:off x="8479973" y="3429000"/>
+            <a:off x="8641220" y="3067703"/>
             <a:ext cx="914400" cy="914400"/>
           </a:xfrm>
           <a:prstGeom prst="ellipse">
@@ -6241,7 +6248,7 @@
         </p:nvSpPr>
         <p:spPr>
           <a:xfrm>
-            <a:off x="852386" y="6215743"/>
+            <a:off x="790263" y="5559639"/>
             <a:ext cx="317716" cy="369332"/>
           </a:xfrm>
           <a:prstGeom prst="rect">
@@ -6276,7 +6283,7 @@
         </p:nvSpPr>
         <p:spPr>
           <a:xfrm>
-            <a:off x="2166257" y="6161314"/>
+            <a:off x="2111829" y="5559639"/>
             <a:ext cx="309700" cy="369332"/>
           </a:xfrm>
           <a:prstGeom prst="rect">
@@ -6311,7 +6318,7 @@
         </p:nvSpPr>
         <p:spPr>
           <a:xfrm>
-            <a:off x="3229759" y="4517180"/>
+            <a:off x="3414739" y="4311966"/>
             <a:ext cx="308098" cy="369332"/>
           </a:xfrm>
           <a:prstGeom prst="rect">
@@ -6346,7 +6353,7 @@
         </p:nvSpPr>
         <p:spPr>
           <a:xfrm>
-            <a:off x="3995057" y="3109963"/>
+            <a:off x="4553129" y="3038719"/>
             <a:ext cx="327334" cy="369332"/>
           </a:xfrm>
           <a:prstGeom prst="rect">
@@ -6381,7 +6388,7 @@
         </p:nvSpPr>
         <p:spPr>
           <a:xfrm>
-            <a:off x="7117229" y="3109963"/>
+            <a:off x="7117229" y="3038719"/>
             <a:ext cx="317716" cy="369332"/>
           </a:xfrm>
           <a:prstGeom prst="rect">
@@ -6416,7 +6423,7 @@
         </p:nvSpPr>
         <p:spPr>
           <a:xfrm>
-            <a:off x="8039645" y="4517180"/>
+            <a:off x="8248556" y="4311966"/>
             <a:ext cx="309700" cy="369332"/>
           </a:xfrm>
           <a:prstGeom prst="rect">
@@ -6451,7 +6458,7 @@
         </p:nvSpPr>
         <p:spPr>
           <a:xfrm>
-            <a:off x="9207295" y="6161314"/>
+            <a:off x="9586384" y="5556287"/>
             <a:ext cx="309700" cy="369332"/>
           </a:xfrm>
           <a:prstGeom prst="rect">
@@ -6486,7 +6493,7 @@
         </p:nvSpPr>
         <p:spPr>
           <a:xfrm>
-            <a:off x="10537371" y="6161314"/>
+            <a:off x="10915545" y="5556287"/>
             <a:ext cx="327334" cy="369332"/>
           </a:xfrm>
           <a:prstGeom prst="rect">
@@ -6517,14 +6524,16 @@
             </a:extLst>
           </p:cNvPr>
           <p:cNvCxnSpPr>
+            <a:cxnSpLocks/>
             <a:stCxn id="3" idx="3"/>
+            <a:endCxn id="4" idx="7"/>
           </p:cNvCxnSpPr>
           <p:nvPr/>
         </p:nvCxnSpPr>
         <p:spPr>
           <a:xfrm flipH="1">
-            <a:off x="2797629" y="2692632"/>
-            <a:ext cx="416939" cy="786663"/>
+            <a:off x="3120918" y="2646511"/>
+            <a:ext cx="550850" cy="555103"/>
           </a:xfrm>
           <a:prstGeom prst="straightConnector1">
             <a:avLst/>
@@ -6558,14 +6567,16 @@
             </a:extLst>
           </p:cNvPr>
           <p:cNvCxnSpPr>
+            <a:cxnSpLocks/>
             <a:stCxn id="4" idx="3"/>
+            <a:endCxn id="5" idx="7"/>
           </p:cNvCxnSpPr>
           <p:nvPr/>
         </p:nvCxnSpPr>
         <p:spPr>
           <a:xfrm flipH="1">
-            <a:off x="1915886" y="4198603"/>
-            <a:ext cx="384282" cy="699967"/>
+            <a:off x="1944318" y="3848192"/>
+            <a:ext cx="530022" cy="582998"/>
           </a:xfrm>
           <a:prstGeom prst="straightConnector1">
             <a:avLst/>
@@ -6599,14 +6610,16 @@
             </a:extLst>
           </p:cNvPr>
           <p:cNvCxnSpPr>
+            <a:cxnSpLocks/>
             <a:stCxn id="5" idx="3"/>
+            <a:endCxn id="10" idx="0"/>
           </p:cNvCxnSpPr>
           <p:nvPr/>
         </p:nvCxnSpPr>
         <p:spPr>
           <a:xfrm flipH="1">
-            <a:off x="1011244" y="5679059"/>
-            <a:ext cx="374524" cy="482255"/>
+            <a:off x="949121" y="5077768"/>
+            <a:ext cx="348619" cy="481871"/>
           </a:xfrm>
           <a:prstGeom prst="straightConnector1">
             <a:avLst/>
@@ -6647,8 +6660,8 @@
         </p:nvCxnSpPr>
         <p:spPr>
           <a:xfrm>
-            <a:off x="2032346" y="5679059"/>
-            <a:ext cx="288761" cy="482255"/>
+            <a:off x="1944318" y="5077768"/>
+            <a:ext cx="322361" cy="481871"/>
           </a:xfrm>
           <a:prstGeom prst="straightConnector1">
             <a:avLst/>
@@ -6689,8 +6702,8 @@
         </p:nvCxnSpPr>
         <p:spPr>
           <a:xfrm>
-            <a:off x="2946746" y="4198603"/>
-            <a:ext cx="437062" cy="318577"/>
+            <a:off x="3120918" y="3848192"/>
+            <a:ext cx="447870" cy="463774"/>
           </a:xfrm>
           <a:prstGeom prst="straightConnector1">
             <a:avLst/>
@@ -6731,8 +6744,8 @@
         </p:nvCxnSpPr>
         <p:spPr>
           <a:xfrm>
-            <a:off x="3861146" y="2692632"/>
-            <a:ext cx="297578" cy="417331"/>
+            <a:off x="4318346" y="2646511"/>
+            <a:ext cx="398450" cy="392208"/>
           </a:xfrm>
           <a:prstGeom prst="straightConnector1">
             <a:avLst/>
@@ -6774,7 +6787,7 @@
         <p:spPr>
           <a:xfrm flipH="1">
             <a:off x="7276087" y="2699775"/>
-            <a:ext cx="292769" cy="410188"/>
+            <a:ext cx="292769" cy="338944"/>
           </a:xfrm>
           <a:prstGeom prst="straightConnector1">
             <a:avLst/>
@@ -6815,8 +6828,8 @@
         </p:nvCxnSpPr>
         <p:spPr>
           <a:xfrm flipH="1">
-            <a:off x="8194495" y="4209489"/>
-            <a:ext cx="419389" cy="307691"/>
+            <a:off x="8403406" y="3848192"/>
+            <a:ext cx="371725" cy="463774"/>
           </a:xfrm>
           <a:prstGeom prst="straightConnector1">
             <a:avLst/>
@@ -6857,8 +6870,8 @@
         </p:nvCxnSpPr>
         <p:spPr>
           <a:xfrm flipH="1">
-            <a:off x="9362145" y="5809688"/>
-            <a:ext cx="394737" cy="351626"/>
+            <a:off x="9741234" y="5077768"/>
+            <a:ext cx="322361" cy="478519"/>
           </a:xfrm>
           <a:prstGeom prst="straightConnector1">
             <a:avLst/>
@@ -6899,8 +6912,8 @@
         </p:nvCxnSpPr>
         <p:spPr>
           <a:xfrm>
-            <a:off x="10403460" y="5809688"/>
-            <a:ext cx="297578" cy="351626"/>
+            <a:off x="10710173" y="5077768"/>
+            <a:ext cx="369039" cy="478519"/>
           </a:xfrm>
           <a:prstGeom prst="straightConnector1">
             <a:avLst/>
@@ -6934,14 +6947,16 @@
             </a:extLst>
           </p:cNvPr>
           <p:cNvCxnSpPr>
+            <a:cxnSpLocks/>
             <a:stCxn id="7" idx="5"/>
+            <a:endCxn id="6" idx="1"/>
           </p:cNvCxnSpPr>
           <p:nvPr/>
         </p:nvCxnSpPr>
         <p:spPr>
           <a:xfrm>
-            <a:off x="9260462" y="4209489"/>
-            <a:ext cx="591109" cy="819710"/>
+            <a:off x="9421709" y="3848192"/>
+            <a:ext cx="641886" cy="582998"/>
           </a:xfrm>
           <a:prstGeom prst="straightConnector1">
             <a:avLst/>
@@ -6975,14 +6990,16 @@
             </a:extLst>
           </p:cNvPr>
           <p:cNvCxnSpPr>
+            <a:cxnSpLocks/>
             <a:stCxn id="8" idx="5"/>
+            <a:endCxn id="7" idx="1"/>
           </p:cNvCxnSpPr>
           <p:nvPr/>
         </p:nvCxnSpPr>
         <p:spPr>
           <a:xfrm>
             <a:off x="8215434" y="2699775"/>
-            <a:ext cx="493137" cy="729225"/>
+            <a:ext cx="559697" cy="501839"/>
           </a:xfrm>
           <a:prstGeom prst="straightConnector1">
             <a:avLst/>
@@ -7020,8 +7037,8 @@
         </p:nvSpPr>
         <p:spPr>
           <a:xfrm>
-            <a:off x="3992229" y="4886512"/>
-            <a:ext cx="3576172" cy="646331"/>
+            <a:off x="4106931" y="4909956"/>
+            <a:ext cx="3299878" cy="646331"/>
           </a:xfrm>
           <a:prstGeom prst="rect">
             <a:avLst/>
@@ -7036,13 +7053,13 @@
           <a:p>
             <a:r>
               <a:rPr lang="en-US" dirty="0"/>
-              <a:t>One rotation with additional work.</a:t>
-            </a:r>
-          </a:p>
-          <a:p>
-            <a:r>
-              <a:rPr lang="en-US" dirty="0"/>
-              <a:t>There is also a mirror image version.</a:t>
+              <a:t>Two right rotates (G, and then P).</a:t>
+            </a:r>
+          </a:p>
+          <a:p>
+            <a:r>
+              <a:rPr lang="en-US" dirty="0"/>
+              <a:t>There is also a mirror image.</a:t>
             </a:r>
           </a:p>
         </p:txBody>
@@ -7061,7 +7078,7 @@
         </p:nvSpPr>
         <p:spPr>
           <a:xfrm>
-            <a:off x="5218343" y="3942392"/>
+            <a:off x="5537016" y="3566604"/>
             <a:ext cx="742511" cy="830997"/>
           </a:xfrm>
           <a:prstGeom prst="rect">
@@ -7267,7 +7284,7 @@
           <a:p>
             <a:r>
               <a:rPr lang="en-US" dirty="0"/>
-              <a:t>Splay Tree Find (Look Up)</a:t>
+              <a:t>Splay Tree Find</a:t>
             </a:r>
           </a:p>
         </p:txBody>
@@ -7310,6 +7327,408 @@
     <p:extLst>
       <p:ext uri="{BB962C8B-B14F-4D97-AF65-F5344CB8AC3E}">
         <p14:creationId xmlns:p14="http://schemas.microsoft.com/office/powerpoint/2010/main" val="1912793489"/>
+      </p:ext>
+    </p:extLst>
+  </p:cSld>
+  <p:clrMapOvr>
+    <a:masterClrMapping/>
+  </p:clrMapOvr>
+</p:sld>
+</file>
+
+<file path=ppt/slides/slide17.xml><?xml version="1.0" encoding="utf-8"?>
+<p:sld xmlns:a="http://schemas.openxmlformats.org/drawingml/2006/main" xmlns:r="http://schemas.openxmlformats.org/officeDocument/2006/relationships" xmlns:p="http://schemas.openxmlformats.org/presentationml/2006/main">
+  <p:cSld>
+    <p:spTree>
+      <p:nvGrpSpPr>
+        <p:cNvPr id="1" name=""/>
+        <p:cNvGrpSpPr/>
+        <p:nvPr/>
+      </p:nvGrpSpPr>
+      <p:grpSpPr>
+        <a:xfrm>
+          <a:off x="0" y="0"/>
+          <a:ext cx="0" cy="0"/>
+          <a:chOff x="0" y="0"/>
+          <a:chExt cx="0" cy="0"/>
+        </a:xfrm>
+      </p:grpSpPr>
+      <p:sp>
+        <p:nvSpPr>
+          <p:cNvPr id="2" name="Title 1">
+            <a:extLst>
+              <a:ext uri="{FF2B5EF4-FFF2-40B4-BE49-F238E27FC236}">
+                <a16:creationId xmlns:a16="http://schemas.microsoft.com/office/drawing/2014/main" id="{714DEE04-9645-30AA-E1B7-F7D4D3A339C0}"/>
+              </a:ext>
+            </a:extLst>
+          </p:cNvPr>
+          <p:cNvSpPr>
+            <a:spLocks noGrp="1"/>
+          </p:cNvSpPr>
+          <p:nvPr>
+            <p:ph type="title"/>
+          </p:nvPr>
+        </p:nvSpPr>
+        <p:spPr/>
+        <p:txBody>
+          <a:bodyPr/>
+          <a:lstStyle/>
+          <a:p>
+            <a:r>
+              <a:rPr lang="en-US" dirty="0"/>
+              <a:t>Splay Tree Erase</a:t>
+            </a:r>
+          </a:p>
+        </p:txBody>
+      </p:sp>
+      <p:sp>
+        <p:nvSpPr>
+          <p:cNvPr id="3" name="Content Placeholder 2">
+            <a:extLst>
+              <a:ext uri="{FF2B5EF4-FFF2-40B4-BE49-F238E27FC236}">
+                <a16:creationId xmlns:a16="http://schemas.microsoft.com/office/drawing/2014/main" id="{13148081-DA4E-8016-4490-73D79AD2A160}"/>
+              </a:ext>
+            </a:extLst>
+          </p:cNvPr>
+          <p:cNvSpPr>
+            <a:spLocks noGrp="1"/>
+          </p:cNvSpPr>
+          <p:nvPr>
+            <p:ph idx="1"/>
+          </p:nvPr>
+        </p:nvSpPr>
+        <p:spPr/>
+        <p:txBody>
+          <a:bodyPr/>
+          <a:lstStyle/>
+          <a:p>
+            <a:r>
+              <a:rPr lang="en-US" i="1" dirty="0"/>
+              <a:t>NOT IMPLEMENTED!</a:t>
+            </a:r>
+          </a:p>
+          <a:p>
+            <a:pPr lvl="1"/>
+            <a:r>
+              <a:rPr lang="en-US" dirty="0"/>
+              <a:t>We will cover this later</a:t>
+            </a:r>
+          </a:p>
+        </p:txBody>
+      </p:sp>
+    </p:spTree>
+    <p:extLst>
+      <p:ext uri="{BB962C8B-B14F-4D97-AF65-F5344CB8AC3E}">
+        <p14:creationId xmlns:p14="http://schemas.microsoft.com/office/powerpoint/2010/main" val="2555479267"/>
+      </p:ext>
+    </p:extLst>
+  </p:cSld>
+  <p:clrMapOvr>
+    <a:masterClrMapping/>
+  </p:clrMapOvr>
+</p:sld>
+</file>
+
+<file path=ppt/slides/slide18.xml><?xml version="1.0" encoding="utf-8"?>
+<p:sld xmlns:a="http://schemas.openxmlformats.org/drawingml/2006/main" xmlns:r="http://schemas.openxmlformats.org/officeDocument/2006/relationships" xmlns:p="http://schemas.openxmlformats.org/presentationml/2006/main">
+  <p:cSld>
+    <p:spTree>
+      <p:nvGrpSpPr>
+        <p:cNvPr id="1" name=""/>
+        <p:cNvGrpSpPr/>
+        <p:nvPr/>
+      </p:nvGrpSpPr>
+      <p:grpSpPr>
+        <a:xfrm>
+          <a:off x="0" y="0"/>
+          <a:ext cx="0" cy="0"/>
+          <a:chOff x="0" y="0"/>
+          <a:chExt cx="0" cy="0"/>
+        </a:xfrm>
+      </p:grpSpPr>
+      <p:sp>
+        <p:nvSpPr>
+          <p:cNvPr id="2" name="Title 1">
+            <a:extLst>
+              <a:ext uri="{FF2B5EF4-FFF2-40B4-BE49-F238E27FC236}">
+                <a16:creationId xmlns:a16="http://schemas.microsoft.com/office/drawing/2014/main" id="{90F796FD-0ED6-6867-39D5-85FC9F2E1C68}"/>
+              </a:ext>
+            </a:extLst>
+          </p:cNvPr>
+          <p:cNvSpPr>
+            <a:spLocks noGrp="1"/>
+          </p:cNvSpPr>
+          <p:nvPr>
+            <p:ph type="title"/>
+          </p:nvPr>
+        </p:nvSpPr>
+        <p:spPr/>
+        <p:txBody>
+          <a:bodyPr/>
+          <a:lstStyle/>
+          <a:p>
+            <a:r>
+              <a:rPr lang="en-US" dirty="0"/>
+              <a:t>Parent Pointers</a:t>
+            </a:r>
+          </a:p>
+        </p:txBody>
+      </p:sp>
+      <p:sp>
+        <p:nvSpPr>
+          <p:cNvPr id="3" name="Content Placeholder 2">
+            <a:extLst>
+              <a:ext uri="{FF2B5EF4-FFF2-40B4-BE49-F238E27FC236}">
+                <a16:creationId xmlns:a16="http://schemas.microsoft.com/office/drawing/2014/main" id="{CA95F735-638F-AC2A-20DE-EEA551C9DA68}"/>
+              </a:ext>
+            </a:extLst>
+          </p:cNvPr>
+          <p:cNvSpPr>
+            <a:spLocks noGrp="1"/>
+          </p:cNvSpPr>
+          <p:nvPr>
+            <p:ph idx="1"/>
+          </p:nvPr>
+        </p:nvSpPr>
+        <p:spPr/>
+        <p:txBody>
+          <a:bodyPr/>
+          <a:lstStyle/>
+          <a:p>
+            <a:r>
+              <a:rPr lang="en-US" dirty="0"/>
+              <a:t>One way to implement splaying requires that each node contain a pointer to its </a:t>
+            </a:r>
+            <a:r>
+              <a:rPr lang="en-US" i="1" dirty="0"/>
+              <a:t>parent</a:t>
+            </a:r>
+          </a:p>
+          <a:p>
+            <a:pPr lvl="1"/>
+            <a:r>
+              <a:rPr lang="en-US" dirty="0"/>
+              <a:t>The root node has a null parent</a:t>
+            </a:r>
+          </a:p>
+          <a:p>
+            <a:pPr lvl="1"/>
+            <a:r>
+              <a:rPr lang="en-US" dirty="0"/>
+              <a:t>This is so you can find your way “up” the tree toward the root</a:t>
+            </a:r>
+          </a:p>
+          <a:p>
+            <a:pPr lvl="1"/>
+            <a:r>
+              <a:rPr lang="en-US" dirty="0"/>
+              <a:t>Also, iterators need parent pointers to move through the tree</a:t>
+            </a:r>
+          </a:p>
+          <a:p>
+            <a:r>
+              <a:rPr lang="en-US" dirty="0"/>
+              <a:t>There are alternative possibilities. For example:</a:t>
+            </a:r>
+          </a:p>
+          <a:p>
+            <a:pPr lvl="1"/>
+            <a:r>
+              <a:rPr lang="en-US" dirty="0"/>
+              <a:t>When finding or inserting an item, you can remember the access path you used to get there (in, e.g., a vector of pointers to the nodes)</a:t>
+            </a:r>
+          </a:p>
+          <a:p>
+            <a:pPr lvl="1"/>
+            <a:r>
+              <a:rPr lang="en-US" dirty="0"/>
+              <a:t>Iterators could contain similar vectors so they can backtrack up the tree</a:t>
+            </a:r>
+          </a:p>
+          <a:p>
+            <a:pPr lvl="1"/>
+            <a:r>
+              <a:rPr lang="en-US" dirty="0"/>
+              <a:t>This saves space: no need to store a parent pointer (8 bytes?) in each node</a:t>
+            </a:r>
+          </a:p>
+        </p:txBody>
+      </p:sp>
+    </p:spTree>
+    <p:extLst>
+      <p:ext uri="{BB962C8B-B14F-4D97-AF65-F5344CB8AC3E}">
+        <p14:creationId xmlns:p14="http://schemas.microsoft.com/office/powerpoint/2010/main" val="2908038967"/>
+      </p:ext>
+    </p:extLst>
+  </p:cSld>
+  <p:clrMapOvr>
+    <a:masterClrMapping/>
+  </p:clrMapOvr>
+</p:sld>
+</file>
+
+<file path=ppt/slides/slide19.xml><?xml version="1.0" encoding="utf-8"?>
+<p:sld xmlns:a="http://schemas.openxmlformats.org/drawingml/2006/main" xmlns:r="http://schemas.openxmlformats.org/officeDocument/2006/relationships" xmlns:p="http://schemas.openxmlformats.org/presentationml/2006/main">
+  <p:cSld>
+    <p:spTree>
+      <p:nvGrpSpPr>
+        <p:cNvPr id="1" name=""/>
+        <p:cNvGrpSpPr/>
+        <p:nvPr/>
+      </p:nvGrpSpPr>
+      <p:grpSpPr>
+        <a:xfrm>
+          <a:off x="0" y="0"/>
+          <a:ext cx="0" cy="0"/>
+          <a:chOff x="0" y="0"/>
+          <a:chExt cx="0" cy="0"/>
+        </a:xfrm>
+      </p:grpSpPr>
+      <p:sp>
+        <p:nvSpPr>
+          <p:cNvPr id="2" name="Title 1">
+            <a:extLst>
+              <a:ext uri="{FF2B5EF4-FFF2-40B4-BE49-F238E27FC236}">
+                <a16:creationId xmlns:a16="http://schemas.microsoft.com/office/drawing/2014/main" id="{21CDD56F-764F-3617-2A71-EF40053E8017}"/>
+              </a:ext>
+            </a:extLst>
+          </p:cNvPr>
+          <p:cNvSpPr>
+            <a:spLocks noGrp="1"/>
+          </p:cNvSpPr>
+          <p:nvPr>
+            <p:ph type="title"/>
+          </p:nvPr>
+        </p:nvSpPr>
+        <p:spPr/>
+        <p:txBody>
+          <a:bodyPr/>
+          <a:lstStyle/>
+          <a:p>
+            <a:r>
+              <a:rPr lang="en-US" dirty="0"/>
+              <a:t>Smart Pointers</a:t>
+            </a:r>
+          </a:p>
+        </p:txBody>
+      </p:sp>
+      <p:sp>
+        <p:nvSpPr>
+          <p:cNvPr id="3" name="Content Placeholder 2">
+            <a:extLst>
+              <a:ext uri="{FF2B5EF4-FFF2-40B4-BE49-F238E27FC236}">
+                <a16:creationId xmlns:a16="http://schemas.microsoft.com/office/drawing/2014/main" id="{B864873B-53E5-CC24-06EC-1BB743299C6A}"/>
+              </a:ext>
+            </a:extLst>
+          </p:cNvPr>
+          <p:cNvSpPr>
+            <a:spLocks noGrp="1"/>
+          </p:cNvSpPr>
+          <p:nvPr>
+            <p:ph idx="1"/>
+          </p:nvPr>
+        </p:nvSpPr>
+        <p:spPr/>
+        <p:txBody>
+          <a:bodyPr/>
+          <a:lstStyle/>
+          <a:p>
+            <a:r>
+              <a:rPr lang="en-US" dirty="0"/>
+              <a:t>If the left and right child pointers are </a:t>
+            </a:r>
+            <a:r>
+              <a:rPr lang="en-US" i="1" dirty="0"/>
+              <a:t>smart,</a:t>
+            </a:r>
+            <a:r>
+              <a:rPr lang="en-US" dirty="0"/>
+              <a:t> they can automatically release the tree’s memory</a:t>
+            </a:r>
+          </a:p>
+          <a:p>
+            <a:r>
+              <a:rPr lang="en-US" dirty="0"/>
+              <a:t>This also allows an iterator to remain valid even when the tree it points into is destroyed (the smart pointer in the iterator prevents destruction of the node it points at)</a:t>
+            </a:r>
+          </a:p>
+          <a:p>
+            <a:pPr lvl="1"/>
+            <a:r>
+              <a:rPr lang="en-US" dirty="0"/>
+              <a:t>Although moving the iterator in this case will leak memory since only the subtree it points at will be destroyed</a:t>
+            </a:r>
+            <a:r>
+              <a:rPr lang="en-US" baseline="30000" dirty="0"/>
+              <a:t>*</a:t>
+            </a:r>
+            <a:endParaRPr lang="en-US" dirty="0"/>
+          </a:p>
+          <a:p>
+            <a:r>
+              <a:rPr lang="en-US" dirty="0"/>
+              <a:t>The child pointers should be </a:t>
+            </a:r>
+            <a:r>
+              <a:rPr lang="en-US" dirty="0" err="1">
+                <a:latin typeface="Consolas" panose="020B0609020204030204" pitchFamily="49" charset="0"/>
+                <a:cs typeface="Consolas" panose="020B0609020204030204" pitchFamily="49" charset="0"/>
+              </a:rPr>
+              <a:t>shared_ptr</a:t>
+            </a:r>
+            <a:r>
+              <a:rPr lang="en-US" dirty="0">
+                <a:latin typeface="Consolas" panose="020B0609020204030204" pitchFamily="49" charset="0"/>
+                <a:cs typeface="Consolas" panose="020B0609020204030204" pitchFamily="49" charset="0"/>
+              </a:rPr>
+              <a:t>&lt;Node&gt;</a:t>
+            </a:r>
+            <a:r>
+              <a:rPr lang="en-US" dirty="0"/>
+              <a:t> so that they can be shared with iterators</a:t>
+            </a:r>
+          </a:p>
+        </p:txBody>
+      </p:sp>
+      <p:sp>
+        <p:nvSpPr>
+          <p:cNvPr id="4" name="TextBox 3">
+            <a:extLst>
+              <a:ext uri="{FF2B5EF4-FFF2-40B4-BE49-F238E27FC236}">
+                <a16:creationId xmlns:a16="http://schemas.microsoft.com/office/drawing/2014/main" id="{C104ADA1-9B8B-D397-6F9C-62DE55F780C5}"/>
+              </a:ext>
+            </a:extLst>
+          </p:cNvPr>
+          <p:cNvSpPr txBox="1"/>
+          <p:nvPr/>
+        </p:nvSpPr>
+        <p:spPr>
+          <a:xfrm>
+            <a:off x="3073025" y="6176963"/>
+            <a:ext cx="6045950" cy="369332"/>
+          </a:xfrm>
+          <a:prstGeom prst="rect">
+            <a:avLst/>
+          </a:prstGeom>
+          <a:noFill/>
+        </p:spPr>
+        <p:txBody>
+          <a:bodyPr wrap="none" rtlCol="0">
+            <a:spAutoFit/>
+          </a:bodyPr>
+          <a:lstStyle/>
+          <a:p>
+            <a:r>
+              <a:rPr lang="en-US" dirty="0"/>
+              <a:t>* because the parent pointers need to be weak to break cycles</a:t>
+            </a:r>
+          </a:p>
+        </p:txBody>
+      </p:sp>
+    </p:spTree>
+    <p:extLst>
+      <p:ext uri="{BB962C8B-B14F-4D97-AF65-F5344CB8AC3E}">
+        <p14:creationId xmlns:p14="http://schemas.microsoft.com/office/powerpoint/2010/main" val="1415099356"/>
       </p:ext>
     </p:extLst>
   </p:cSld>
@@ -7416,14 +7835,14 @@
             </a:r>
             <a:r>
               <a:rPr lang="en-US" dirty="0"/>
-              <a:t>. This ordering relation defines what it means for one item to “come before” another</a:t>
+              <a:t>. This relation defines what it means for one item to “come before” another in the desired ordering</a:t>
             </a:r>
           </a:p>
           <a:p>
             <a:pPr lvl="1"/>
             <a:r>
               <a:rPr lang="en-US" dirty="0"/>
-              <a:t>The data item in the left child of a node “comes before” the data item in the node, and the data item in the node “comes before” the data item in the right child</a:t>
+              <a:t>The data item in the left child “comes before” the data item in the parent node, and the data item in the parent node “comes before” the data item in the right child</a:t>
             </a:r>
           </a:p>
           <a:p>
@@ -7719,7 +8138,15 @@
             <a:pPr lvl="1"/>
             <a:r>
               <a:rPr lang="en-US" dirty="0"/>
-              <a:t>It is weak in the sense that some pairs of elements are </a:t>
+              <a:t>It is </a:t>
+            </a:r>
+            <a:r>
+              <a:rPr lang="en-US" i="1" dirty="0"/>
+              <a:t>weak</a:t>
+            </a:r>
+            <a:r>
+              <a:rPr lang="en-US" dirty="0"/>
+              <a:t> in the sense that some pairs of elements are </a:t>
             </a:r>
             <a:r>
               <a:rPr lang="en-US" u="sng" dirty="0"/>
@@ -7761,7 +8188,7 @@
             </a:r>
             <a:r>
               <a:rPr lang="en-US" dirty="0"/>
-              <a:t>are both false. </a:t>
+              <a:t>are false. </a:t>
             </a:r>
             <a:r>
               <a:rPr lang="en-US" i="1" dirty="0"/>
@@ -7787,7 +8214,11 @@
             </a:r>
             <a:r>
               <a:rPr lang="en-US" i="1" dirty="0"/>
-              <a:t> are equivalent</a:t>
+              <a:t> are </a:t>
+            </a:r>
+            <a:r>
+              <a:rPr lang="en-US" i="1" u="sng" dirty="0"/>
+              <a:t>equivalent</a:t>
             </a:r>
           </a:p>
           <a:p>
@@ -7795,6 +8226,17 @@
             <a:r>
               <a:rPr lang="en-US" dirty="0"/>
               <a:t>The equivalence relation is also transitive</a:t>
+            </a:r>
+          </a:p>
+          <a:p>
+            <a:pPr lvl="1"/>
+            <a:r>
+              <a:rPr lang="en-US" dirty="0"/>
+              <a:t>A subset of values that are equivalent to each other form an </a:t>
+            </a:r>
+            <a:r>
+              <a:rPr lang="en-US" i="1" dirty="0"/>
+              <a:t>equivalence class</a:t>
             </a:r>
           </a:p>
         </p:txBody>
@@ -7880,7 +8322,18 @@
           <a:p>
             <a:r>
               <a:rPr lang="en-US" dirty="0"/>
-              <a:t>Consider operator&lt; as applied to integers</a:t>
+              <a:t>Consider </a:t>
+            </a:r>
+            <a:r>
+              <a:rPr lang="en-US" dirty="0">
+                <a:latin typeface="Consolas" panose="020B0609020204030204" pitchFamily="49" charset="0"/>
+                <a:cs typeface="Consolas" panose="020B0609020204030204" pitchFamily="49" charset="0"/>
+              </a:rPr>
+              <a:t>operator&lt;</a:t>
+            </a:r>
+            <a:r>
+              <a:rPr lang="en-US" dirty="0"/>
+              <a:t> as applied to integers</a:t>
             </a:r>
           </a:p>
           <a:p>
@@ -7894,41 +8347,63 @@
             <a:pPr lvl="1"/>
             <a:r>
               <a:rPr lang="en-US" dirty="0"/>
-              <a:t>Each </a:t>
-            </a:r>
-            <a:r>
-              <a:rPr lang="en-US" i="1" dirty="0"/>
-              <a:t>equivalence class</a:t>
-            </a:r>
-            <a:r>
-              <a:rPr lang="en-US" dirty="0"/>
-              <a:t> (a set of objects that are equivalent with each other) contains only a single value, e.g., 4 is equivalent to only 4.</a:t>
-            </a:r>
-          </a:p>
-          <a:p>
-            <a:r>
-              <a:rPr lang="en-US" dirty="0"/>
-              <a:t>Consider operator&gt; as applied to integers</a:t>
+              <a:t>Each equivalence class contains only a single value, e.g., 4 is equivalent to only 4 and no other integer.</a:t>
+            </a:r>
+          </a:p>
+          <a:p>
+            <a:r>
+              <a:rPr lang="en-US" dirty="0"/>
+              <a:t>Consider </a:t>
+            </a:r>
+            <a:r>
+              <a:rPr lang="en-US" dirty="0">
+                <a:latin typeface="Consolas" panose="020B0609020204030204" pitchFamily="49" charset="0"/>
+                <a:cs typeface="Consolas" panose="020B0609020204030204" pitchFamily="49" charset="0"/>
+              </a:rPr>
+              <a:t>operator&gt;</a:t>
+            </a:r>
+            <a:r>
+              <a:rPr lang="en-US" dirty="0"/>
+              <a:t> as applied to integers</a:t>
             </a:r>
           </a:p>
           <a:p>
             <a:pPr lvl="1"/>
             <a:r>
               <a:rPr lang="en-US" dirty="0"/>
-              <a:t>This is also an SWO (although the order is the opposite of operator&lt;)</a:t>
-            </a:r>
-          </a:p>
-          <a:p>
-            <a:r>
-              <a:rPr lang="en-US" dirty="0"/>
-              <a:t>Consider case-insensitive alphabetical order of strings</a:t>
+              <a:t>This is also an SWO (although the order is the opposite of </a:t>
+            </a:r>
+            <a:r>
+              <a:rPr lang="en-US" dirty="0">
+                <a:latin typeface="Consolas" panose="020B0609020204030204" pitchFamily="49" charset="0"/>
+                <a:cs typeface="Consolas" panose="020B0609020204030204" pitchFamily="49" charset="0"/>
+              </a:rPr>
+              <a:t>operator&lt;</a:t>
+            </a:r>
+            <a:r>
+              <a:rPr lang="en-US" dirty="0"/>
+              <a:t>)</a:t>
+            </a:r>
+          </a:p>
+          <a:p>
+            <a:r>
+              <a:rPr lang="en-US" dirty="0"/>
+              <a:t>Consider </a:t>
+            </a:r>
+            <a:r>
+              <a:rPr lang="en-US" u="sng" dirty="0"/>
+              <a:t>case-insensitive</a:t>
+            </a:r>
+            <a:r>
+              <a:rPr lang="en-US" dirty="0"/>
+              <a:t> alphabetical order of strings</a:t>
             </a:r>
           </a:p>
           <a:p>
             <a:pPr lvl="1"/>
             <a:r>
               <a:rPr lang="en-US" dirty="0"/>
-              <a:t>This s also an SWO. Equivalence classes have more than one member (“apple”, “APPLE”, “</a:t>
+              <a:t>This is also an SWO. Equivalence classes have more than one member: (“apple”, “APPLE”, “</a:t>
             </a:r>
             <a:r>
               <a:rPr lang="en-US" dirty="0" err="1"/>
@@ -8039,7 +8514,7 @@
             <a:pPr lvl="1"/>
             <a:r>
               <a:rPr lang="en-US" dirty="0"/>
-              <a:t>This emphasizes that it need not be “less than”</a:t>
+              <a:t>This emphasizes that it need not be “less than” in the usual sense</a:t>
             </a:r>
           </a:p>
           <a:p>
@@ -8081,7 +8556,29 @@
           <a:p>
             <a:r>
               <a:rPr lang="en-US" dirty="0"/>
-              <a:t>Changing &lt; to &lt;= in the function makes this no longer an SWO.</a:t>
+              <a:t>Changing </a:t>
+            </a:r>
+            <a:r>
+              <a:rPr lang="en-US" dirty="0">
+                <a:latin typeface="Consolas" panose="020B0609020204030204" pitchFamily="49" charset="0"/>
+                <a:cs typeface="Consolas" panose="020B0609020204030204" pitchFamily="49" charset="0"/>
+              </a:rPr>
+              <a:t>&lt;</a:t>
+            </a:r>
+            <a:r>
+              <a:rPr lang="en-US" dirty="0"/>
+              <a:t> to </a:t>
+            </a:r>
+            <a:r>
+              <a:rPr lang="en-US" dirty="0">
+                <a:latin typeface="Consolas" panose="020B0609020204030204" pitchFamily="49" charset="0"/>
+                <a:cs typeface="Consolas" panose="020B0609020204030204" pitchFamily="49" charset="0"/>
+              </a:rPr>
+              <a:t>&lt;=</a:t>
+            </a:r>
+            <a:r>
+              <a:rPr lang="en-US" dirty="0"/>
+              <a:t> in the function makes this no longer an SWO.</a:t>
             </a:r>
           </a:p>
         </p:txBody>
@@ -8100,7 +8597,7 @@
         </p:nvSpPr>
         <p:spPr>
           <a:xfrm>
-            <a:off x="838200" y="3401129"/>
+            <a:off x="838200" y="3314043"/>
             <a:ext cx="9175910" cy="1200329"/>
           </a:xfrm>
           <a:prstGeom prst="rect">
@@ -8147,7 +8644,7 @@
                 <a:latin typeface="Consolas" panose="020B0609020204030204" pitchFamily="49" charset="0"/>
                 <a:cs typeface="Consolas" panose="020B0609020204030204" pitchFamily="49" charset="0"/>
               </a:rPr>
-              <a:t>int</a:t>
+              <a:t>unsigned</a:t>
             </a:r>
             <a:r>
               <a:rPr lang="en-US" dirty="0">
@@ -8161,7 +8658,7 @@
                 <a:latin typeface="Consolas" panose="020B0609020204030204" pitchFamily="49" charset="0"/>
                 <a:cs typeface="Consolas" panose="020B0609020204030204" pitchFamily="49" charset="0"/>
               </a:rPr>
-              <a:t>int</a:t>
+              <a:t>unsigned</a:t>
             </a:r>
             <a:r>
               <a:rPr lang="en-US" dirty="0">
@@ -8309,7 +8806,18 @@
           <a:p>
             <a:r>
               <a:rPr lang="en-US" dirty="0"/>
-              <a:t>Every binary search tree has an SWO that defines the ordering inside the tree. Using ordinary operator&lt; on integers:</a:t>
+              <a:t>Every binary search tree has an SWO that defines the ordering inside the tree. For example, using ordinary </a:t>
+            </a:r>
+            <a:r>
+              <a:rPr lang="en-US" dirty="0">
+                <a:latin typeface="Consolas" panose="020B0609020204030204" pitchFamily="49" charset="0"/>
+                <a:cs typeface="Consolas" panose="020B0609020204030204" pitchFamily="49" charset="0"/>
+              </a:rPr>
+              <a:t>operator&lt;</a:t>
+            </a:r>
+            <a:r>
+              <a:rPr lang="en-US" dirty="0"/>
+              <a:t> on integers:</a:t>
             </a:r>
           </a:p>
         </p:txBody>
@@ -8377,7 +8885,7 @@
         </p:nvSpPr>
         <p:spPr>
           <a:xfrm>
-            <a:off x="4343400" y="5262563"/>
+            <a:off x="4567679" y="5396474"/>
             <a:ext cx="914400" cy="914400"/>
           </a:xfrm>
           <a:prstGeom prst="ellipse">
@@ -8426,7 +8934,7 @@
         </p:nvSpPr>
         <p:spPr>
           <a:xfrm>
-            <a:off x="2890158" y="4001294"/>
+            <a:off x="3156965" y="4135205"/>
             <a:ext cx="914400" cy="914400"/>
           </a:xfrm>
           <a:prstGeom prst="ellipse">
@@ -8475,7 +8983,7 @@
         </p:nvSpPr>
         <p:spPr>
           <a:xfrm>
-            <a:off x="6664779" y="4001294"/>
+            <a:off x="6587498" y="4135205"/>
             <a:ext cx="914400" cy="914400"/>
           </a:xfrm>
           <a:prstGeom prst="ellipse">
@@ -8521,13 +9029,15 @@
           </p:cNvPr>
           <p:cNvCxnSpPr>
             <a:cxnSpLocks/>
+            <a:stCxn id="4" idx="3"/>
+            <a:endCxn id="6" idx="7"/>
           </p:cNvCxnSpPr>
           <p:nvPr/>
         </p:nvCxnSpPr>
         <p:spPr>
           <a:xfrm flipH="1">
-            <a:off x="3719913" y="3505200"/>
-            <a:ext cx="1080687" cy="683422"/>
+            <a:off x="3937454" y="3610775"/>
+            <a:ext cx="997057" cy="658341"/>
           </a:xfrm>
           <a:prstGeom prst="straightConnector1">
             <a:avLst/>
@@ -8560,13 +9070,17 @@
               </a:ext>
             </a:extLst>
           </p:cNvPr>
-          <p:cNvCxnSpPr/>
+          <p:cNvCxnSpPr>
+            <a:cxnSpLocks/>
+            <a:stCxn id="4" idx="5"/>
+            <a:endCxn id="7" idx="1"/>
+          </p:cNvCxnSpPr>
           <p:nvPr/>
         </p:nvCxnSpPr>
         <p:spPr>
           <a:xfrm>
-            <a:off x="5715000" y="3505200"/>
-            <a:ext cx="949779" cy="729343"/>
+            <a:off x="5581089" y="3610775"/>
+            <a:ext cx="1140320" cy="658341"/>
           </a:xfrm>
           <a:prstGeom prst="straightConnector1">
             <a:avLst/>
@@ -8599,13 +9113,17 @@
               </a:ext>
             </a:extLst>
           </p:cNvPr>
-          <p:cNvCxnSpPr/>
+          <p:cNvCxnSpPr>
+            <a:cxnSpLocks/>
+            <a:stCxn id="6" idx="5"/>
+            <a:endCxn id="5" idx="1"/>
+          </p:cNvCxnSpPr>
           <p:nvPr/>
         </p:nvCxnSpPr>
         <p:spPr>
           <a:xfrm>
-            <a:off x="3719913" y="4789714"/>
-            <a:ext cx="710573" cy="620486"/>
+            <a:off x="3937454" y="4915694"/>
+            <a:ext cx="764136" cy="614691"/>
           </a:xfrm>
           <a:prstGeom prst="straightConnector1">
             <a:avLst/>
@@ -8678,7 +9196,7 @@
         </p:nvSpPr>
         <p:spPr>
           <a:xfrm>
-            <a:off x="7614558" y="4234543"/>
+            <a:off x="7502006" y="4407739"/>
             <a:ext cx="1123513" cy="369332"/>
           </a:xfrm>
           <a:prstGeom prst="rect">
@@ -8713,7 +9231,7 @@
         </p:nvSpPr>
         <p:spPr>
           <a:xfrm>
-            <a:off x="1764958" y="4234543"/>
+            <a:off x="2154489" y="4407739"/>
             <a:ext cx="998543" cy="369332"/>
           </a:xfrm>
           <a:prstGeom prst="rect">
@@ -8806,7 +9324,7 @@
         </p:nvSpPr>
         <p:spPr>
           <a:xfrm>
-            <a:off x="4800599" y="1972015"/>
+            <a:off x="5192884" y="1690688"/>
             <a:ext cx="914400" cy="914400"/>
           </a:xfrm>
           <a:prstGeom prst="ellipse">
@@ -8855,7 +9373,7 @@
         </p:nvSpPr>
         <p:spPr>
           <a:xfrm>
-            <a:off x="6629399" y="3429000"/>
+            <a:off x="7097887" y="3147673"/>
             <a:ext cx="914400" cy="914400"/>
           </a:xfrm>
           <a:prstGeom prst="ellipse">
@@ -8904,7 +9422,7 @@
         </p:nvSpPr>
         <p:spPr>
           <a:xfrm>
-            <a:off x="2971799" y="3429000"/>
+            <a:off x="3364084" y="3147673"/>
             <a:ext cx="914400" cy="914400"/>
           </a:xfrm>
           <a:prstGeom prst="ellipse">
@@ -8953,7 +9471,7 @@
         </p:nvSpPr>
         <p:spPr>
           <a:xfrm>
-            <a:off x="2057399" y="4996543"/>
+            <a:off x="2215642" y="4715216"/>
             <a:ext cx="914400" cy="914400"/>
           </a:xfrm>
           <a:prstGeom prst="ellipse">
@@ -9002,7 +9520,7 @@
         </p:nvSpPr>
         <p:spPr>
           <a:xfrm>
-            <a:off x="3886199" y="4996543"/>
+            <a:off x="4572398" y="4715216"/>
             <a:ext cx="914400" cy="914400"/>
           </a:xfrm>
           <a:prstGeom prst="ellipse">
@@ -9051,7 +9569,7 @@
         </p:nvSpPr>
         <p:spPr>
           <a:xfrm>
-            <a:off x="5714999" y="4996543"/>
+            <a:off x="5911340" y="4729263"/>
             <a:ext cx="914400" cy="914400"/>
           </a:xfrm>
           <a:prstGeom prst="ellipse">
@@ -9100,7 +9618,7 @@
         </p:nvSpPr>
         <p:spPr>
           <a:xfrm>
-            <a:off x="7543799" y="4996543"/>
+            <a:off x="8342654" y="4715216"/>
             <a:ext cx="914400" cy="914400"/>
           </a:xfrm>
           <a:prstGeom prst="ellipse">
@@ -9145,14 +9663,16 @@
             </a:extLst>
           </p:cNvPr>
           <p:cNvCxnSpPr>
+            <a:cxnSpLocks/>
+            <a:stCxn id="3" idx="3"/>
             <a:endCxn id="5" idx="7"/>
           </p:cNvCxnSpPr>
           <p:nvPr/>
         </p:nvCxnSpPr>
         <p:spPr>
           <a:xfrm flipH="1">
-            <a:off x="3752288" y="2677886"/>
-            <a:ext cx="1048311" cy="885025"/>
+            <a:off x="4144573" y="2471177"/>
+            <a:ext cx="1182222" cy="810407"/>
           </a:xfrm>
           <a:prstGeom prst="straightConnector1">
             <a:avLst/>
@@ -9186,14 +9706,16 @@
             </a:extLst>
           </p:cNvPr>
           <p:cNvCxnSpPr>
+            <a:cxnSpLocks/>
+            <a:stCxn id="3" idx="5"/>
             <a:endCxn id="4" idx="1"/>
           </p:cNvCxnSpPr>
           <p:nvPr/>
         </p:nvCxnSpPr>
         <p:spPr>
           <a:xfrm>
-            <a:off x="5714999" y="2677886"/>
-            <a:ext cx="1048311" cy="885025"/>
+            <a:off x="5973373" y="2471177"/>
+            <a:ext cx="1258425" cy="810407"/>
           </a:xfrm>
           <a:prstGeom prst="straightConnector1">
             <a:avLst/>
@@ -9228,13 +9750,15 @@
           </p:cNvPr>
           <p:cNvCxnSpPr>
             <a:cxnSpLocks/>
+            <a:stCxn id="5" idx="3"/>
+            <a:endCxn id="6" idx="7"/>
           </p:cNvCxnSpPr>
           <p:nvPr/>
         </p:nvCxnSpPr>
         <p:spPr>
           <a:xfrm flipH="1">
-            <a:off x="2754086" y="4343400"/>
-            <a:ext cx="402771" cy="653143"/>
+            <a:off x="2996131" y="3928162"/>
+            <a:ext cx="501864" cy="920965"/>
           </a:xfrm>
           <a:prstGeom prst="straightConnector1">
             <a:avLst/>
@@ -9269,13 +9793,15 @@
           </p:cNvPr>
           <p:cNvCxnSpPr>
             <a:cxnSpLocks/>
+            <a:stCxn id="5" idx="5"/>
+            <a:endCxn id="7" idx="1"/>
           </p:cNvCxnSpPr>
           <p:nvPr/>
         </p:nvCxnSpPr>
         <p:spPr>
           <a:xfrm>
-            <a:off x="3701141" y="4314025"/>
-            <a:ext cx="435430" cy="682518"/>
+            <a:off x="4144573" y="3928162"/>
+            <a:ext cx="561736" cy="920965"/>
           </a:xfrm>
           <a:prstGeom prst="straightConnector1">
             <a:avLst/>
@@ -9310,13 +9836,15 @@
           </p:cNvPr>
           <p:cNvCxnSpPr>
             <a:cxnSpLocks/>
+            <a:stCxn id="4" idx="3"/>
+            <a:endCxn id="8" idx="7"/>
           </p:cNvCxnSpPr>
           <p:nvPr/>
         </p:nvCxnSpPr>
         <p:spPr>
           <a:xfrm flipH="1">
-            <a:off x="6400800" y="4314025"/>
-            <a:ext cx="362510" cy="682518"/>
+            <a:off x="6691829" y="3928162"/>
+            <a:ext cx="539969" cy="935012"/>
           </a:xfrm>
           <a:prstGeom prst="straightConnector1">
             <a:avLst/>
@@ -9351,13 +9879,15 @@
           </p:cNvPr>
           <p:cNvCxnSpPr>
             <a:cxnSpLocks/>
+            <a:stCxn id="4" idx="5"/>
+            <a:endCxn id="9" idx="1"/>
           </p:cNvCxnSpPr>
           <p:nvPr/>
         </p:nvCxnSpPr>
         <p:spPr>
           <a:xfrm>
-            <a:off x="7409888" y="4343400"/>
-            <a:ext cx="362512" cy="653143"/>
+            <a:off x="7878376" y="3928162"/>
+            <a:ext cx="598189" cy="920965"/>
           </a:xfrm>
           <a:prstGeom prst="straightConnector1">
             <a:avLst/>
@@ -9395,8 +9925,8 @@
         </p:nvSpPr>
         <p:spPr>
           <a:xfrm>
-            <a:off x="5519055" y="3167742"/>
-            <a:ext cx="3135087" cy="3135086"/>
+            <a:off x="5780712" y="2886415"/>
+            <a:ext cx="3693142" cy="3135086"/>
           </a:xfrm>
           <a:prstGeom prst="rect">
             <a:avLst/>
@@ -9443,7 +9973,7 @@
         </p:nvSpPr>
         <p:spPr>
           <a:xfrm>
-            <a:off x="7399001" y="2701749"/>
+            <a:off x="7791286" y="2420422"/>
             <a:ext cx="3562514" cy="369332"/>
           </a:xfrm>
           <a:prstGeom prst="rect">
@@ -9552,7 +10082,7 @@
             <a:pPr lvl="1"/>
             <a:r>
               <a:rPr lang="en-US" dirty="0"/>
-              <a:t>Looking up an item runs in </a:t>
+              <a:t>Finding an item runs in </a:t>
             </a:r>
             <a:r>
               <a:rPr lang="en-US" i="1" dirty="0"/>
@@ -9597,7 +10127,15 @@
             <a:pPr lvl="1"/>
             <a:r>
               <a:rPr lang="en-US" dirty="0"/>
-              <a:t>Even when N is large (billions) the number of comparisons needed is small (dozens)</a:t>
+              <a:t>Even when </a:t>
+            </a:r>
+            <a:r>
+              <a:rPr lang="en-US" i="1" dirty="0"/>
+              <a:t>N</a:t>
+            </a:r>
+            <a:r>
+              <a:rPr lang="en-US" dirty="0"/>
+              <a:t> is large (billions) the number of comparisons needed is small (dozens)</a:t>
             </a:r>
           </a:p>
           <a:p>
@@ -9827,7 +10365,7 @@
         </p:nvSpPr>
         <p:spPr>
           <a:xfrm>
-            <a:off x="7489372" y="2514600"/>
+            <a:off x="7623283" y="2514600"/>
             <a:ext cx="914400" cy="914400"/>
           </a:xfrm>
           <a:prstGeom prst="ellipse">
@@ -9876,7 +10414,7 @@
         </p:nvSpPr>
         <p:spPr>
           <a:xfrm>
-            <a:off x="8403772" y="3712028"/>
+            <a:off x="8741229" y="3716112"/>
             <a:ext cx="914400" cy="914400"/>
           </a:xfrm>
           <a:prstGeom prst="ellipse">
@@ -9925,7 +10463,7 @@
         </p:nvSpPr>
         <p:spPr>
           <a:xfrm>
-            <a:off x="9318172" y="5072743"/>
+            <a:off x="9971315" y="5040086"/>
             <a:ext cx="914400" cy="914400"/>
           </a:xfrm>
           <a:prstGeom prst="ellipse">
@@ -9970,14 +10508,16 @@
             </a:extLst>
           </p:cNvPr>
           <p:cNvCxnSpPr>
+            <a:cxnSpLocks/>
+            <a:stCxn id="4" idx="5"/>
             <a:endCxn id="5" idx="1"/>
           </p:cNvCxnSpPr>
           <p:nvPr/>
         </p:nvCxnSpPr>
         <p:spPr>
           <a:xfrm>
-            <a:off x="7326085" y="2289402"/>
-            <a:ext cx="297198" cy="359109"/>
+            <a:off x="7355461" y="2155491"/>
+            <a:ext cx="401733" cy="493020"/>
           </a:xfrm>
           <a:prstGeom prst="straightConnector1">
             <a:avLst/>
@@ -10011,14 +10551,16 @@
             </a:extLst>
           </p:cNvPr>
           <p:cNvCxnSpPr>
+            <a:cxnSpLocks/>
+            <a:stCxn id="5" idx="5"/>
             <a:endCxn id="6" idx="1"/>
           </p:cNvCxnSpPr>
           <p:nvPr/>
         </p:nvCxnSpPr>
         <p:spPr>
           <a:xfrm>
-            <a:off x="8218714" y="3429000"/>
-            <a:ext cx="318969" cy="416939"/>
+            <a:off x="8403772" y="3295089"/>
+            <a:ext cx="471368" cy="554934"/>
           </a:xfrm>
           <a:prstGeom prst="straightConnector1">
             <a:avLst/>
@@ -10051,13 +10593,17 @@
               </a:ext>
             </a:extLst>
           </p:cNvPr>
-          <p:cNvCxnSpPr/>
+          <p:cNvCxnSpPr>
+            <a:cxnSpLocks/>
+            <a:stCxn id="6" idx="5"/>
+            <a:endCxn id="7" idx="1"/>
+          </p:cNvCxnSpPr>
           <p:nvPr/>
         </p:nvCxnSpPr>
         <p:spPr>
           <a:xfrm>
-            <a:off x="9154885" y="4626428"/>
-            <a:ext cx="359229" cy="446315"/>
+            <a:off x="9521718" y="4496601"/>
+            <a:ext cx="583508" cy="677396"/>
           </a:xfrm>
           <a:prstGeom prst="straightConnector1">
             <a:avLst/>

</xml_diff>

<commit_message>
More work on the SplayTrees presentation.
</commit_message>
<xml_diff>
--- a/SplayTree/SplayTrees.pptx
+++ b/SplayTree/SplayTrees.pptx
@@ -24,6 +24,10 @@
     <p:sldId id="272" r:id="rId18"/>
     <p:sldId id="273" r:id="rId19"/>
     <p:sldId id="274" r:id="rId20"/>
+    <p:sldId id="275" r:id="rId21"/>
+    <p:sldId id="276" r:id="rId22"/>
+    <p:sldId id="277" r:id="rId23"/>
+    <p:sldId id="278" r:id="rId24"/>
   </p:sldIdLst>
   <p:sldSz cx="12192000" cy="6858000"/>
   <p:notesSz cx="6858000" cy="9144000"/>
@@ -277,7 +281,7 @@
           <a:p>
             <a:fld id="{531C5E8B-99A0-3C49-903D-B96D78C70B9F}" type="datetimeFigureOut">
               <a:rPr lang="en-US" smtClean="0"/>
-              <a:t>11/8/23</a:t>
+              <a:t>11/9/23</a:t>
             </a:fld>
             <a:endParaRPr lang="en-US"/>
           </a:p>
@@ -475,7 +479,7 @@
           <a:p>
             <a:fld id="{531C5E8B-99A0-3C49-903D-B96D78C70B9F}" type="datetimeFigureOut">
               <a:rPr lang="en-US" smtClean="0"/>
-              <a:t>11/8/23</a:t>
+              <a:t>11/9/23</a:t>
             </a:fld>
             <a:endParaRPr lang="en-US"/>
           </a:p>
@@ -683,7 +687,7 @@
           <a:p>
             <a:fld id="{531C5E8B-99A0-3C49-903D-B96D78C70B9F}" type="datetimeFigureOut">
               <a:rPr lang="en-US" smtClean="0"/>
-              <a:t>11/8/23</a:t>
+              <a:t>11/9/23</a:t>
             </a:fld>
             <a:endParaRPr lang="en-US"/>
           </a:p>
@@ -881,7 +885,7 @@
           <a:p>
             <a:fld id="{531C5E8B-99A0-3C49-903D-B96D78C70B9F}" type="datetimeFigureOut">
               <a:rPr lang="en-US" smtClean="0"/>
-              <a:t>11/8/23</a:t>
+              <a:t>11/9/23</a:t>
             </a:fld>
             <a:endParaRPr lang="en-US"/>
           </a:p>
@@ -1156,7 +1160,7 @@
           <a:p>
             <a:fld id="{531C5E8B-99A0-3C49-903D-B96D78C70B9F}" type="datetimeFigureOut">
               <a:rPr lang="en-US" smtClean="0"/>
-              <a:t>11/8/23</a:t>
+              <a:t>11/9/23</a:t>
             </a:fld>
             <a:endParaRPr lang="en-US"/>
           </a:p>
@@ -1421,7 +1425,7 @@
           <a:p>
             <a:fld id="{531C5E8B-99A0-3C49-903D-B96D78C70B9F}" type="datetimeFigureOut">
               <a:rPr lang="en-US" smtClean="0"/>
-              <a:t>11/8/23</a:t>
+              <a:t>11/9/23</a:t>
             </a:fld>
             <a:endParaRPr lang="en-US"/>
           </a:p>
@@ -1833,7 +1837,7 @@
           <a:p>
             <a:fld id="{531C5E8B-99A0-3C49-903D-B96D78C70B9F}" type="datetimeFigureOut">
               <a:rPr lang="en-US" smtClean="0"/>
-              <a:t>11/8/23</a:t>
+              <a:t>11/9/23</a:t>
             </a:fld>
             <a:endParaRPr lang="en-US"/>
           </a:p>
@@ -1974,7 +1978,7 @@
           <a:p>
             <a:fld id="{531C5E8B-99A0-3C49-903D-B96D78C70B9F}" type="datetimeFigureOut">
               <a:rPr lang="en-US" smtClean="0"/>
-              <a:t>11/8/23</a:t>
+              <a:t>11/9/23</a:t>
             </a:fld>
             <a:endParaRPr lang="en-US"/>
           </a:p>
@@ -2087,7 +2091,7 @@
           <a:p>
             <a:fld id="{531C5E8B-99A0-3C49-903D-B96D78C70B9F}" type="datetimeFigureOut">
               <a:rPr lang="en-US" smtClean="0"/>
-              <a:t>11/8/23</a:t>
+              <a:t>11/9/23</a:t>
             </a:fld>
             <a:endParaRPr lang="en-US"/>
           </a:p>
@@ -2398,7 +2402,7 @@
           <a:p>
             <a:fld id="{531C5E8B-99A0-3C49-903D-B96D78C70B9F}" type="datetimeFigureOut">
               <a:rPr lang="en-US" smtClean="0"/>
-              <a:t>11/8/23</a:t>
+              <a:t>11/9/23</a:t>
             </a:fld>
             <a:endParaRPr lang="en-US"/>
           </a:p>
@@ -2686,7 +2690,7 @@
           <a:p>
             <a:fld id="{531C5E8B-99A0-3C49-903D-B96D78C70B9F}" type="datetimeFigureOut">
               <a:rPr lang="en-US" smtClean="0"/>
-              <a:t>11/8/23</a:t>
+              <a:t>11/9/23</a:t>
             </a:fld>
             <a:endParaRPr lang="en-US"/>
           </a:p>
@@ -2927,7 +2931,7 @@
           <a:p>
             <a:fld id="{531C5E8B-99A0-3C49-903D-B96D78C70B9F}" type="datetimeFigureOut">
               <a:rPr lang="en-US" smtClean="0"/>
-              <a:t>11/8/23</a:t>
+              <a:t>11/9/23</a:t>
             </a:fld>
             <a:endParaRPr lang="en-US"/>
           </a:p>
@@ -4254,7 +4258,7 @@
           <a:prstGeom prst="straightConnector1">
             <a:avLst/>
           </a:prstGeom>
-          <a:ln>
+          <a:ln w="19050">
             <a:tailEnd type="triangle"/>
           </a:ln>
         </p:spPr>
@@ -4297,7 +4301,7 @@
           <a:prstGeom prst="straightConnector1">
             <a:avLst/>
           </a:prstGeom>
-          <a:ln>
+          <a:ln w="19050">
             <a:tailEnd type="triangle"/>
           </a:ln>
         </p:spPr>
@@ -4339,7 +4343,7 @@
           <a:prstGeom prst="straightConnector1">
             <a:avLst/>
           </a:prstGeom>
-          <a:ln>
+          <a:ln w="19050">
             <a:tailEnd type="triangle"/>
           </a:ln>
         </p:spPr>
@@ -4381,7 +4385,7 @@
           <a:prstGeom prst="straightConnector1">
             <a:avLst/>
           </a:prstGeom>
-          <a:ln>
+          <a:ln w="19050">
             <a:tailEnd type="triangle"/>
           </a:ln>
         </p:spPr>
@@ -4423,7 +4427,7 @@
           <a:prstGeom prst="straightConnector1">
             <a:avLst/>
           </a:prstGeom>
-          <a:ln>
+          <a:ln w="19050">
             <a:tailEnd type="triangle"/>
           </a:ln>
         </p:spPr>
@@ -4465,7 +4469,7 @@
           <a:prstGeom prst="straightConnector1">
             <a:avLst/>
           </a:prstGeom>
-          <a:ln>
+          <a:ln w="19050">
             <a:tailEnd type="triangle"/>
           </a:ln>
         </p:spPr>
@@ -4507,7 +4511,7 @@
           <a:prstGeom prst="straightConnector1">
             <a:avLst/>
           </a:prstGeom>
-          <a:ln>
+          <a:ln w="19050">
             <a:tailEnd type="triangle"/>
           </a:ln>
         </p:spPr>
@@ -4549,7 +4553,7 @@
           <a:prstGeom prst="straightConnector1">
             <a:avLst/>
           </a:prstGeom>
-          <a:ln>
+          <a:ln w="19050">
             <a:tailEnd type="triangle"/>
           </a:ln>
         </p:spPr>
@@ -5042,7 +5046,7 @@
           <a:prstGeom prst="straightConnector1">
             <a:avLst/>
           </a:prstGeom>
-          <a:ln>
+          <a:ln w="19050">
             <a:tailEnd type="triangle"/>
           </a:ln>
         </p:spPr>
@@ -5085,7 +5089,7 @@
           <a:prstGeom prst="straightConnector1">
             <a:avLst/>
           </a:prstGeom>
-          <a:ln>
+          <a:ln w="19050">
             <a:tailEnd type="triangle"/>
           </a:ln>
         </p:spPr>
@@ -5128,7 +5132,7 @@
           <a:prstGeom prst="straightConnector1">
             <a:avLst/>
           </a:prstGeom>
-          <a:ln>
+          <a:ln w="19050">
             <a:tailEnd type="triangle"/>
           </a:ln>
         </p:spPr>
@@ -5170,7 +5174,7 @@
           <a:prstGeom prst="straightConnector1">
             <a:avLst/>
           </a:prstGeom>
-          <a:ln>
+          <a:ln w="19050">
             <a:tailEnd type="triangle"/>
           </a:ln>
         </p:spPr>
@@ -5492,7 +5496,7 @@
           <a:prstGeom prst="straightConnector1">
             <a:avLst/>
           </a:prstGeom>
-          <a:ln>
+          <a:ln w="19050">
             <a:tailEnd type="triangle"/>
           </a:ln>
         </p:spPr>
@@ -5534,7 +5538,7 @@
           <a:prstGeom prst="straightConnector1">
             <a:avLst/>
           </a:prstGeom>
-          <a:ln>
+          <a:ln w="19050">
             <a:tailEnd type="triangle"/>
           </a:ln>
         </p:spPr>
@@ -5576,7 +5580,7 @@
           <a:prstGeom prst="straightConnector1">
             <a:avLst/>
           </a:prstGeom>
-          <a:ln>
+          <a:ln w="19050">
             <a:tailEnd type="triangle"/>
           </a:ln>
         </p:spPr>
@@ -5618,7 +5622,7 @@
           <a:prstGeom prst="straightConnector1">
             <a:avLst/>
           </a:prstGeom>
-          <a:ln>
+          <a:ln w="19050">
             <a:tailEnd type="triangle"/>
           </a:ln>
         </p:spPr>
@@ -5660,7 +5664,7 @@
           <a:prstGeom prst="straightConnector1">
             <a:avLst/>
           </a:prstGeom>
-          <a:ln>
+          <a:ln w="19050">
             <a:tailEnd type="triangle"/>
           </a:ln>
         </p:spPr>
@@ -5702,7 +5706,7 @@
           <a:prstGeom prst="straightConnector1">
             <a:avLst/>
           </a:prstGeom>
-          <a:ln>
+          <a:ln w="19050">
             <a:tailEnd type="triangle"/>
           </a:ln>
         </p:spPr>
@@ -5744,7 +5748,7 @@
           <a:prstGeom prst="straightConnector1">
             <a:avLst/>
           </a:prstGeom>
-          <a:ln>
+          <a:ln w="19050">
             <a:tailEnd type="triangle"/>
           </a:ln>
         </p:spPr>
@@ -5787,7 +5791,7 @@
           <a:prstGeom prst="straightConnector1">
             <a:avLst/>
           </a:prstGeom>
-          <a:ln>
+          <a:ln w="19050">
             <a:tailEnd type="triangle"/>
           </a:ln>
         </p:spPr>
@@ -6538,7 +6542,7 @@
           <a:prstGeom prst="straightConnector1">
             <a:avLst/>
           </a:prstGeom>
-          <a:ln>
+          <a:ln w="19050">
             <a:tailEnd type="triangle"/>
           </a:ln>
         </p:spPr>
@@ -6581,7 +6585,7 @@
           <a:prstGeom prst="straightConnector1">
             <a:avLst/>
           </a:prstGeom>
-          <a:ln>
+          <a:ln w="19050">
             <a:tailEnd type="triangle"/>
           </a:ln>
         </p:spPr>
@@ -6624,7 +6628,7 @@
           <a:prstGeom prst="straightConnector1">
             <a:avLst/>
           </a:prstGeom>
-          <a:ln>
+          <a:ln w="19050">
             <a:tailEnd type="triangle"/>
           </a:ln>
         </p:spPr>
@@ -6666,7 +6670,7 @@
           <a:prstGeom prst="straightConnector1">
             <a:avLst/>
           </a:prstGeom>
-          <a:ln>
+          <a:ln w="19050">
             <a:tailEnd type="triangle"/>
           </a:ln>
         </p:spPr>
@@ -6708,7 +6712,7 @@
           <a:prstGeom prst="straightConnector1">
             <a:avLst/>
           </a:prstGeom>
-          <a:ln>
+          <a:ln w="19050">
             <a:tailEnd type="triangle"/>
           </a:ln>
         </p:spPr>
@@ -6750,7 +6754,7 @@
           <a:prstGeom prst="straightConnector1">
             <a:avLst/>
           </a:prstGeom>
-          <a:ln>
+          <a:ln w="19050">
             <a:tailEnd type="triangle"/>
           </a:ln>
         </p:spPr>
@@ -6792,7 +6796,7 @@
           <a:prstGeom prst="straightConnector1">
             <a:avLst/>
           </a:prstGeom>
-          <a:ln>
+          <a:ln w="19050">
             <a:tailEnd type="triangle"/>
           </a:ln>
         </p:spPr>
@@ -6834,7 +6838,7 @@
           <a:prstGeom prst="straightConnector1">
             <a:avLst/>
           </a:prstGeom>
-          <a:ln>
+          <a:ln w="19050">
             <a:tailEnd type="triangle"/>
           </a:ln>
         </p:spPr>
@@ -6876,7 +6880,7 @@
           <a:prstGeom prst="straightConnector1">
             <a:avLst/>
           </a:prstGeom>
-          <a:ln>
+          <a:ln w="19050">
             <a:tailEnd type="triangle"/>
           </a:ln>
         </p:spPr>
@@ -6918,7 +6922,7 @@
           <a:prstGeom prst="straightConnector1">
             <a:avLst/>
           </a:prstGeom>
-          <a:ln>
+          <a:ln w="19050">
             <a:tailEnd type="triangle"/>
           </a:ln>
         </p:spPr>
@@ -6961,7 +6965,7 @@
           <a:prstGeom prst="straightConnector1">
             <a:avLst/>
           </a:prstGeom>
-          <a:ln>
+          <a:ln w="19050">
             <a:tailEnd type="triangle"/>
           </a:ln>
         </p:spPr>
@@ -7004,7 +7008,7 @@
           <a:prstGeom prst="straightConnector1">
             <a:avLst/>
           </a:prstGeom>
-          <a:ln>
+          <a:ln w="19050">
             <a:tailEnd type="triangle"/>
           </a:ln>
         </p:spPr>
@@ -7318,7 +7322,7 @@
           <a:p>
             <a:r>
               <a:rPr lang="en-US" dirty="0"/>
-              <a:t>Once found, move the node to the root using the splay tree transformations as described on the previous slide</a:t>
+              <a:t>Once found, move the node to the root using the splay tree transformations as described on the previous slides</a:t>
             </a:r>
           </a:p>
         </p:txBody>
@@ -7492,12 +7496,14 @@
         </p:nvSpPr>
         <p:spPr/>
         <p:txBody>
-          <a:bodyPr/>
-          <a:lstStyle/>
-          <a:p>
-            <a:r>
-              <a:rPr lang="en-US" dirty="0"/>
-              <a:t>One way to implement splaying requires that each node contain a pointer to its </a:t>
+          <a:bodyPr>
+            <a:normAutofit/>
+          </a:bodyPr>
+          <a:lstStyle/>
+          <a:p>
+            <a:r>
+              <a:rPr lang="en-US" dirty="0"/>
+              <a:t>Splaying requires that each node contain a pointer to its </a:t>
             </a:r>
             <a:r>
               <a:rPr lang="en-US" i="1" dirty="0"/>
@@ -7549,7 +7555,7 @@
             <a:pPr lvl="1"/>
             <a:r>
               <a:rPr lang="en-US" dirty="0"/>
-              <a:t>This saves space: no need to store a parent pointer (8 bytes?) in each node</a:t>
+              <a:t>This saves space: no need to store a parent pointer (8 bytes?) in each node, but iterators are larger and more complicated</a:t>
             </a:r>
           </a:p>
         </p:txBody>
@@ -7656,7 +7662,7 @@
             <a:pPr lvl="1"/>
             <a:r>
               <a:rPr lang="en-US" dirty="0"/>
-              <a:t>Although moving the iterator in this case will leak memory since only the subtree it points at will be destroyed</a:t>
+              <a:t>… although moving the iterator in this case will leak memory since only the subtree it points at will be destroyed</a:t>
             </a:r>
             <a:r>
               <a:rPr lang="en-US" baseline="30000" dirty="0"/>
@@ -7864,6 +7870,1975 @@
 </p:sld>
 </file>
 
+<file path=ppt/slides/slide20.xml><?xml version="1.0" encoding="utf-8"?>
+<p:sld xmlns:a="http://schemas.openxmlformats.org/drawingml/2006/main" xmlns:r="http://schemas.openxmlformats.org/officeDocument/2006/relationships" xmlns:p="http://schemas.openxmlformats.org/presentationml/2006/main">
+  <p:cSld>
+    <p:spTree>
+      <p:nvGrpSpPr>
+        <p:cNvPr id="1" name=""/>
+        <p:cNvGrpSpPr/>
+        <p:nvPr/>
+      </p:nvGrpSpPr>
+      <p:grpSpPr>
+        <a:xfrm>
+          <a:off x="0" y="0"/>
+          <a:ext cx="0" cy="0"/>
+          <a:chOff x="0" y="0"/>
+          <a:chExt cx="0" cy="0"/>
+        </a:xfrm>
+      </p:grpSpPr>
+      <p:sp>
+        <p:nvSpPr>
+          <p:cNvPr id="2" name="Title 1">
+            <a:extLst>
+              <a:ext uri="{FF2B5EF4-FFF2-40B4-BE49-F238E27FC236}">
+                <a16:creationId xmlns:a16="http://schemas.microsoft.com/office/drawing/2014/main" id="{25002CE1-DF8E-E048-AD7B-4672929EE371}"/>
+              </a:ext>
+            </a:extLst>
+          </p:cNvPr>
+          <p:cNvSpPr>
+            <a:spLocks noGrp="1"/>
+          </p:cNvSpPr>
+          <p:nvPr>
+            <p:ph type="title"/>
+          </p:nvPr>
+        </p:nvSpPr>
+        <p:spPr/>
+        <p:txBody>
+          <a:bodyPr/>
+          <a:lstStyle/>
+          <a:p>
+            <a:r>
+              <a:rPr lang="en-US" dirty="0"/>
+              <a:t>Tree with Iterator</a:t>
+            </a:r>
+          </a:p>
+        </p:txBody>
+      </p:sp>
+      <p:sp>
+        <p:nvSpPr>
+          <p:cNvPr id="3" name="Oval 2">
+            <a:extLst>
+              <a:ext uri="{FF2B5EF4-FFF2-40B4-BE49-F238E27FC236}">
+                <a16:creationId xmlns:a16="http://schemas.microsoft.com/office/drawing/2014/main" id="{62B9AF11-9923-21D4-4489-72F3F637B697}"/>
+              </a:ext>
+            </a:extLst>
+          </p:cNvPr>
+          <p:cNvSpPr/>
+          <p:nvPr/>
+        </p:nvSpPr>
+        <p:spPr>
+          <a:xfrm>
+            <a:off x="5192884" y="1690688"/>
+            <a:ext cx="914400" cy="914400"/>
+          </a:xfrm>
+          <a:prstGeom prst="ellipse">
+            <a:avLst/>
+          </a:prstGeom>
+        </p:spPr>
+        <p:style>
+          <a:lnRef idx="2">
+            <a:schemeClr val="accent1">
+              <a:shade val="15000"/>
+            </a:schemeClr>
+          </a:lnRef>
+          <a:fillRef idx="1">
+            <a:schemeClr val="accent1"/>
+          </a:fillRef>
+          <a:effectRef idx="0">
+            <a:schemeClr val="accent1"/>
+          </a:effectRef>
+          <a:fontRef idx="minor">
+            <a:schemeClr val="lt1"/>
+          </a:fontRef>
+        </p:style>
+        <p:txBody>
+          <a:bodyPr rtlCol="0" anchor="ctr"/>
+          <a:lstStyle/>
+          <a:p>
+            <a:pPr algn="ctr"/>
+            <a:r>
+              <a:rPr lang="en-US" dirty="0"/>
+              <a:t>10</a:t>
+            </a:r>
+          </a:p>
+        </p:txBody>
+      </p:sp>
+      <p:sp>
+        <p:nvSpPr>
+          <p:cNvPr id="4" name="Oval 3">
+            <a:extLst>
+              <a:ext uri="{FF2B5EF4-FFF2-40B4-BE49-F238E27FC236}">
+                <a16:creationId xmlns:a16="http://schemas.microsoft.com/office/drawing/2014/main" id="{2FDE460B-59D3-5AFC-9F98-5E680EE1C5D4}"/>
+              </a:ext>
+            </a:extLst>
+          </p:cNvPr>
+          <p:cNvSpPr/>
+          <p:nvPr/>
+        </p:nvSpPr>
+        <p:spPr>
+          <a:xfrm>
+            <a:off x="7097887" y="3147673"/>
+            <a:ext cx="914400" cy="914400"/>
+          </a:xfrm>
+          <a:prstGeom prst="ellipse">
+            <a:avLst/>
+          </a:prstGeom>
+        </p:spPr>
+        <p:style>
+          <a:lnRef idx="2">
+            <a:schemeClr val="accent1">
+              <a:shade val="15000"/>
+            </a:schemeClr>
+          </a:lnRef>
+          <a:fillRef idx="1">
+            <a:schemeClr val="accent1"/>
+          </a:fillRef>
+          <a:effectRef idx="0">
+            <a:schemeClr val="accent1"/>
+          </a:effectRef>
+          <a:fontRef idx="minor">
+            <a:schemeClr val="lt1"/>
+          </a:fontRef>
+        </p:style>
+        <p:txBody>
+          <a:bodyPr rtlCol="0" anchor="ctr"/>
+          <a:lstStyle/>
+          <a:p>
+            <a:pPr algn="ctr"/>
+            <a:r>
+              <a:rPr lang="en-US" dirty="0"/>
+              <a:t>12</a:t>
+            </a:r>
+          </a:p>
+        </p:txBody>
+      </p:sp>
+      <p:sp>
+        <p:nvSpPr>
+          <p:cNvPr id="5" name="Oval 4">
+            <a:extLst>
+              <a:ext uri="{FF2B5EF4-FFF2-40B4-BE49-F238E27FC236}">
+                <a16:creationId xmlns:a16="http://schemas.microsoft.com/office/drawing/2014/main" id="{5DD97348-82DA-A815-463D-95CA2F74DD4C}"/>
+              </a:ext>
+            </a:extLst>
+          </p:cNvPr>
+          <p:cNvSpPr/>
+          <p:nvPr/>
+        </p:nvSpPr>
+        <p:spPr>
+          <a:xfrm>
+            <a:off x="3364084" y="3147673"/>
+            <a:ext cx="914400" cy="914400"/>
+          </a:xfrm>
+          <a:prstGeom prst="ellipse">
+            <a:avLst/>
+          </a:prstGeom>
+        </p:spPr>
+        <p:style>
+          <a:lnRef idx="2">
+            <a:schemeClr val="accent1">
+              <a:shade val="15000"/>
+            </a:schemeClr>
+          </a:lnRef>
+          <a:fillRef idx="1">
+            <a:schemeClr val="accent1"/>
+          </a:fillRef>
+          <a:effectRef idx="0">
+            <a:schemeClr val="accent1"/>
+          </a:effectRef>
+          <a:fontRef idx="minor">
+            <a:schemeClr val="lt1"/>
+          </a:fontRef>
+        </p:style>
+        <p:txBody>
+          <a:bodyPr rtlCol="0" anchor="ctr"/>
+          <a:lstStyle/>
+          <a:p>
+            <a:pPr algn="ctr"/>
+            <a:r>
+              <a:rPr lang="en-US" dirty="0"/>
+              <a:t>5</a:t>
+            </a:r>
+          </a:p>
+        </p:txBody>
+      </p:sp>
+      <p:sp>
+        <p:nvSpPr>
+          <p:cNvPr id="6" name="Oval 5">
+            <a:extLst>
+              <a:ext uri="{FF2B5EF4-FFF2-40B4-BE49-F238E27FC236}">
+                <a16:creationId xmlns:a16="http://schemas.microsoft.com/office/drawing/2014/main" id="{8AB52635-DBC7-5070-1229-A27BAB703053}"/>
+              </a:ext>
+            </a:extLst>
+          </p:cNvPr>
+          <p:cNvSpPr/>
+          <p:nvPr/>
+        </p:nvSpPr>
+        <p:spPr>
+          <a:xfrm>
+            <a:off x="2215642" y="4715216"/>
+            <a:ext cx="914400" cy="914400"/>
+          </a:xfrm>
+          <a:prstGeom prst="ellipse">
+            <a:avLst/>
+          </a:prstGeom>
+        </p:spPr>
+        <p:style>
+          <a:lnRef idx="2">
+            <a:schemeClr val="accent1">
+              <a:shade val="15000"/>
+            </a:schemeClr>
+          </a:lnRef>
+          <a:fillRef idx="1">
+            <a:schemeClr val="accent1"/>
+          </a:fillRef>
+          <a:effectRef idx="0">
+            <a:schemeClr val="accent1"/>
+          </a:effectRef>
+          <a:fontRef idx="minor">
+            <a:schemeClr val="lt1"/>
+          </a:fontRef>
+        </p:style>
+        <p:txBody>
+          <a:bodyPr rtlCol="0" anchor="ctr"/>
+          <a:lstStyle/>
+          <a:p>
+            <a:pPr algn="ctr"/>
+            <a:r>
+              <a:rPr lang="en-US" dirty="0"/>
+              <a:t>2</a:t>
+            </a:r>
+          </a:p>
+        </p:txBody>
+      </p:sp>
+      <p:sp>
+        <p:nvSpPr>
+          <p:cNvPr id="7" name="Oval 6">
+            <a:extLst>
+              <a:ext uri="{FF2B5EF4-FFF2-40B4-BE49-F238E27FC236}">
+                <a16:creationId xmlns:a16="http://schemas.microsoft.com/office/drawing/2014/main" id="{6D72B71E-BB44-F6D3-E57A-0D469912A251}"/>
+              </a:ext>
+            </a:extLst>
+          </p:cNvPr>
+          <p:cNvSpPr/>
+          <p:nvPr/>
+        </p:nvSpPr>
+        <p:spPr>
+          <a:xfrm>
+            <a:off x="4572398" y="4715216"/>
+            <a:ext cx="914400" cy="914400"/>
+          </a:xfrm>
+          <a:prstGeom prst="ellipse">
+            <a:avLst/>
+          </a:prstGeom>
+        </p:spPr>
+        <p:style>
+          <a:lnRef idx="2">
+            <a:schemeClr val="accent1">
+              <a:shade val="15000"/>
+            </a:schemeClr>
+          </a:lnRef>
+          <a:fillRef idx="1">
+            <a:schemeClr val="accent1"/>
+          </a:fillRef>
+          <a:effectRef idx="0">
+            <a:schemeClr val="accent1"/>
+          </a:effectRef>
+          <a:fontRef idx="minor">
+            <a:schemeClr val="lt1"/>
+          </a:fontRef>
+        </p:style>
+        <p:txBody>
+          <a:bodyPr rtlCol="0" anchor="ctr"/>
+          <a:lstStyle/>
+          <a:p>
+            <a:pPr algn="ctr"/>
+            <a:r>
+              <a:rPr lang="en-US" dirty="0"/>
+              <a:t>7</a:t>
+            </a:r>
+          </a:p>
+        </p:txBody>
+      </p:sp>
+      <p:sp>
+        <p:nvSpPr>
+          <p:cNvPr id="8" name="Oval 7">
+            <a:extLst>
+              <a:ext uri="{FF2B5EF4-FFF2-40B4-BE49-F238E27FC236}">
+                <a16:creationId xmlns:a16="http://schemas.microsoft.com/office/drawing/2014/main" id="{2CDEC168-326A-B5AC-C7A2-4C048279067A}"/>
+              </a:ext>
+            </a:extLst>
+          </p:cNvPr>
+          <p:cNvSpPr/>
+          <p:nvPr/>
+        </p:nvSpPr>
+        <p:spPr>
+          <a:xfrm>
+            <a:off x="5911340" y="4729263"/>
+            <a:ext cx="914400" cy="914400"/>
+          </a:xfrm>
+          <a:prstGeom prst="ellipse">
+            <a:avLst/>
+          </a:prstGeom>
+        </p:spPr>
+        <p:style>
+          <a:lnRef idx="2">
+            <a:schemeClr val="accent1">
+              <a:shade val="15000"/>
+            </a:schemeClr>
+          </a:lnRef>
+          <a:fillRef idx="1">
+            <a:schemeClr val="accent1"/>
+          </a:fillRef>
+          <a:effectRef idx="0">
+            <a:schemeClr val="accent1"/>
+          </a:effectRef>
+          <a:fontRef idx="minor">
+            <a:schemeClr val="lt1"/>
+          </a:fontRef>
+        </p:style>
+        <p:txBody>
+          <a:bodyPr rtlCol="0" anchor="ctr"/>
+          <a:lstStyle/>
+          <a:p>
+            <a:pPr algn="ctr"/>
+            <a:r>
+              <a:rPr lang="en-US" dirty="0"/>
+              <a:t>11</a:t>
+            </a:r>
+          </a:p>
+        </p:txBody>
+      </p:sp>
+      <p:sp>
+        <p:nvSpPr>
+          <p:cNvPr id="9" name="Oval 8">
+            <a:extLst>
+              <a:ext uri="{FF2B5EF4-FFF2-40B4-BE49-F238E27FC236}">
+                <a16:creationId xmlns:a16="http://schemas.microsoft.com/office/drawing/2014/main" id="{5499010A-3036-6D4A-D989-0EFA31193601}"/>
+              </a:ext>
+            </a:extLst>
+          </p:cNvPr>
+          <p:cNvSpPr/>
+          <p:nvPr/>
+        </p:nvSpPr>
+        <p:spPr>
+          <a:xfrm>
+            <a:off x="8342654" y="4715216"/>
+            <a:ext cx="914400" cy="914400"/>
+          </a:xfrm>
+          <a:prstGeom prst="ellipse">
+            <a:avLst/>
+          </a:prstGeom>
+        </p:spPr>
+        <p:style>
+          <a:lnRef idx="2">
+            <a:schemeClr val="accent1">
+              <a:shade val="15000"/>
+            </a:schemeClr>
+          </a:lnRef>
+          <a:fillRef idx="1">
+            <a:schemeClr val="accent1"/>
+          </a:fillRef>
+          <a:effectRef idx="0">
+            <a:schemeClr val="accent1"/>
+          </a:effectRef>
+          <a:fontRef idx="minor">
+            <a:schemeClr val="lt1"/>
+          </a:fontRef>
+        </p:style>
+        <p:txBody>
+          <a:bodyPr rtlCol="0" anchor="ctr"/>
+          <a:lstStyle/>
+          <a:p>
+            <a:pPr algn="ctr"/>
+            <a:r>
+              <a:rPr lang="en-US" dirty="0"/>
+              <a:t>15</a:t>
+            </a:r>
+          </a:p>
+        </p:txBody>
+      </p:sp>
+      <p:cxnSp>
+        <p:nvCxnSpPr>
+          <p:cNvPr id="11" name="Straight Arrow Connector 10">
+            <a:extLst>
+              <a:ext uri="{FF2B5EF4-FFF2-40B4-BE49-F238E27FC236}">
+                <a16:creationId xmlns:a16="http://schemas.microsoft.com/office/drawing/2014/main" id="{ADC22015-B46D-55F1-3B17-A27C56860404}"/>
+              </a:ext>
+            </a:extLst>
+          </p:cNvPr>
+          <p:cNvCxnSpPr>
+            <a:cxnSpLocks/>
+            <a:stCxn id="3" idx="3"/>
+            <a:endCxn id="5" idx="7"/>
+          </p:cNvCxnSpPr>
+          <p:nvPr/>
+        </p:nvCxnSpPr>
+        <p:spPr>
+          <a:xfrm flipH="1">
+            <a:off x="4144573" y="2471177"/>
+            <a:ext cx="1182222" cy="810407"/>
+          </a:xfrm>
+          <a:prstGeom prst="straightConnector1">
+            <a:avLst/>
+          </a:prstGeom>
+          <a:ln w="19050">
+            <a:tailEnd type="triangle"/>
+          </a:ln>
+        </p:spPr>
+        <p:style>
+          <a:lnRef idx="1">
+            <a:schemeClr val="accent1"/>
+          </a:lnRef>
+          <a:fillRef idx="0">
+            <a:schemeClr val="accent1"/>
+          </a:fillRef>
+          <a:effectRef idx="0">
+            <a:schemeClr val="accent1"/>
+          </a:effectRef>
+          <a:fontRef idx="minor">
+            <a:schemeClr val="tx1"/>
+          </a:fontRef>
+        </p:style>
+      </p:cxnSp>
+      <p:cxnSp>
+        <p:nvCxnSpPr>
+          <p:cNvPr id="13" name="Straight Arrow Connector 12">
+            <a:extLst>
+              <a:ext uri="{FF2B5EF4-FFF2-40B4-BE49-F238E27FC236}">
+                <a16:creationId xmlns:a16="http://schemas.microsoft.com/office/drawing/2014/main" id="{E54EE929-D730-7D8A-9A2A-995FFB898F63}"/>
+              </a:ext>
+            </a:extLst>
+          </p:cNvPr>
+          <p:cNvCxnSpPr>
+            <a:cxnSpLocks/>
+            <a:stCxn id="3" idx="5"/>
+            <a:endCxn id="4" idx="1"/>
+          </p:cNvCxnSpPr>
+          <p:nvPr/>
+        </p:nvCxnSpPr>
+        <p:spPr>
+          <a:xfrm>
+            <a:off x="5973373" y="2471177"/>
+            <a:ext cx="1258425" cy="810407"/>
+          </a:xfrm>
+          <a:prstGeom prst="straightConnector1">
+            <a:avLst/>
+          </a:prstGeom>
+          <a:ln w="19050">
+            <a:tailEnd type="triangle"/>
+          </a:ln>
+        </p:spPr>
+        <p:style>
+          <a:lnRef idx="1">
+            <a:schemeClr val="accent1"/>
+          </a:lnRef>
+          <a:fillRef idx="0">
+            <a:schemeClr val="accent1"/>
+          </a:fillRef>
+          <a:effectRef idx="0">
+            <a:schemeClr val="accent1"/>
+          </a:effectRef>
+          <a:fontRef idx="minor">
+            <a:schemeClr val="tx1"/>
+          </a:fontRef>
+        </p:style>
+      </p:cxnSp>
+      <p:cxnSp>
+        <p:nvCxnSpPr>
+          <p:cNvPr id="15" name="Straight Arrow Connector 14">
+            <a:extLst>
+              <a:ext uri="{FF2B5EF4-FFF2-40B4-BE49-F238E27FC236}">
+                <a16:creationId xmlns:a16="http://schemas.microsoft.com/office/drawing/2014/main" id="{2F3DCC4F-AA73-F190-5A71-CFB5CB14442D}"/>
+              </a:ext>
+            </a:extLst>
+          </p:cNvPr>
+          <p:cNvCxnSpPr>
+            <a:cxnSpLocks/>
+            <a:stCxn id="5" idx="3"/>
+            <a:endCxn id="6" idx="7"/>
+          </p:cNvCxnSpPr>
+          <p:nvPr/>
+        </p:nvCxnSpPr>
+        <p:spPr>
+          <a:xfrm flipH="1">
+            <a:off x="2996131" y="3928162"/>
+            <a:ext cx="501864" cy="920965"/>
+          </a:xfrm>
+          <a:prstGeom prst="straightConnector1">
+            <a:avLst/>
+          </a:prstGeom>
+          <a:ln w="19050">
+            <a:tailEnd type="triangle"/>
+          </a:ln>
+        </p:spPr>
+        <p:style>
+          <a:lnRef idx="1">
+            <a:schemeClr val="accent1"/>
+          </a:lnRef>
+          <a:fillRef idx="0">
+            <a:schemeClr val="accent1"/>
+          </a:fillRef>
+          <a:effectRef idx="0">
+            <a:schemeClr val="accent1"/>
+          </a:effectRef>
+          <a:fontRef idx="minor">
+            <a:schemeClr val="tx1"/>
+          </a:fontRef>
+        </p:style>
+      </p:cxnSp>
+      <p:cxnSp>
+        <p:nvCxnSpPr>
+          <p:cNvPr id="18" name="Straight Arrow Connector 17">
+            <a:extLst>
+              <a:ext uri="{FF2B5EF4-FFF2-40B4-BE49-F238E27FC236}">
+                <a16:creationId xmlns:a16="http://schemas.microsoft.com/office/drawing/2014/main" id="{5B74AFC9-72CE-109E-C241-8C4166BBF4F3}"/>
+              </a:ext>
+            </a:extLst>
+          </p:cNvPr>
+          <p:cNvCxnSpPr>
+            <a:cxnSpLocks/>
+            <a:stCxn id="5" idx="5"/>
+            <a:endCxn id="7" idx="1"/>
+          </p:cNvCxnSpPr>
+          <p:nvPr/>
+        </p:nvCxnSpPr>
+        <p:spPr>
+          <a:xfrm>
+            <a:off x="4144573" y="3928162"/>
+            <a:ext cx="561736" cy="920965"/>
+          </a:xfrm>
+          <a:prstGeom prst="straightConnector1">
+            <a:avLst/>
+          </a:prstGeom>
+          <a:ln w="19050">
+            <a:tailEnd type="triangle"/>
+          </a:ln>
+        </p:spPr>
+        <p:style>
+          <a:lnRef idx="1">
+            <a:schemeClr val="accent1"/>
+          </a:lnRef>
+          <a:fillRef idx="0">
+            <a:schemeClr val="accent1"/>
+          </a:fillRef>
+          <a:effectRef idx="0">
+            <a:schemeClr val="accent1"/>
+          </a:effectRef>
+          <a:fontRef idx="minor">
+            <a:schemeClr val="tx1"/>
+          </a:fontRef>
+        </p:style>
+      </p:cxnSp>
+      <p:cxnSp>
+        <p:nvCxnSpPr>
+          <p:cNvPr id="22" name="Straight Arrow Connector 21">
+            <a:extLst>
+              <a:ext uri="{FF2B5EF4-FFF2-40B4-BE49-F238E27FC236}">
+                <a16:creationId xmlns:a16="http://schemas.microsoft.com/office/drawing/2014/main" id="{FDCEB6C9-51CC-EE7B-1E5E-DB9513F0B7CA}"/>
+              </a:ext>
+            </a:extLst>
+          </p:cNvPr>
+          <p:cNvCxnSpPr>
+            <a:cxnSpLocks/>
+            <a:stCxn id="4" idx="3"/>
+            <a:endCxn id="8" idx="7"/>
+          </p:cNvCxnSpPr>
+          <p:nvPr/>
+        </p:nvCxnSpPr>
+        <p:spPr>
+          <a:xfrm flipH="1">
+            <a:off x="6691829" y="3928162"/>
+            <a:ext cx="539969" cy="935012"/>
+          </a:xfrm>
+          <a:prstGeom prst="straightConnector1">
+            <a:avLst/>
+          </a:prstGeom>
+          <a:ln w="19050">
+            <a:tailEnd type="triangle"/>
+          </a:ln>
+        </p:spPr>
+        <p:style>
+          <a:lnRef idx="1">
+            <a:schemeClr val="accent1"/>
+          </a:lnRef>
+          <a:fillRef idx="0">
+            <a:schemeClr val="accent1"/>
+          </a:fillRef>
+          <a:effectRef idx="0">
+            <a:schemeClr val="accent1"/>
+          </a:effectRef>
+          <a:fontRef idx="minor">
+            <a:schemeClr val="tx1"/>
+          </a:fontRef>
+        </p:style>
+      </p:cxnSp>
+      <p:cxnSp>
+        <p:nvCxnSpPr>
+          <p:cNvPr id="25" name="Straight Arrow Connector 24">
+            <a:extLst>
+              <a:ext uri="{FF2B5EF4-FFF2-40B4-BE49-F238E27FC236}">
+                <a16:creationId xmlns:a16="http://schemas.microsoft.com/office/drawing/2014/main" id="{A8046022-0C5B-8195-C6F1-75DF58057413}"/>
+              </a:ext>
+            </a:extLst>
+          </p:cNvPr>
+          <p:cNvCxnSpPr>
+            <a:cxnSpLocks/>
+            <a:stCxn id="4" idx="5"/>
+            <a:endCxn id="9" idx="1"/>
+          </p:cNvCxnSpPr>
+          <p:nvPr/>
+        </p:nvCxnSpPr>
+        <p:spPr>
+          <a:xfrm>
+            <a:off x="7878376" y="3928162"/>
+            <a:ext cx="598189" cy="920965"/>
+          </a:xfrm>
+          <a:prstGeom prst="straightConnector1">
+            <a:avLst/>
+          </a:prstGeom>
+          <a:ln w="19050">
+            <a:tailEnd type="triangle"/>
+          </a:ln>
+        </p:spPr>
+        <p:style>
+          <a:lnRef idx="1">
+            <a:schemeClr val="accent1"/>
+          </a:lnRef>
+          <a:fillRef idx="0">
+            <a:schemeClr val="accent1"/>
+          </a:fillRef>
+          <a:effectRef idx="0">
+            <a:schemeClr val="accent1"/>
+          </a:effectRef>
+          <a:fontRef idx="minor">
+            <a:schemeClr val="tx1"/>
+          </a:fontRef>
+        </p:style>
+      </p:cxnSp>
+      <p:sp>
+        <p:nvSpPr>
+          <p:cNvPr id="10" name="TextBox 9">
+            <a:extLst>
+              <a:ext uri="{FF2B5EF4-FFF2-40B4-BE49-F238E27FC236}">
+                <a16:creationId xmlns:a16="http://schemas.microsoft.com/office/drawing/2014/main" id="{1DB3B312-018A-1A2D-CA56-D30575102093}"/>
+              </a:ext>
+            </a:extLst>
+          </p:cNvPr>
+          <p:cNvSpPr txBox="1"/>
+          <p:nvPr/>
+        </p:nvSpPr>
+        <p:spPr>
+          <a:xfrm>
+            <a:off x="4079833" y="1967934"/>
+            <a:ext cx="691215" cy="369332"/>
+          </a:xfrm>
+          <a:prstGeom prst="rect">
+            <a:avLst/>
+          </a:prstGeom>
+          <a:noFill/>
+        </p:spPr>
+        <p:txBody>
+          <a:bodyPr wrap="none" rtlCol="0">
+            <a:spAutoFit/>
+          </a:bodyPr>
+          <a:lstStyle/>
+          <a:p>
+            <a:r>
+              <a:rPr lang="en-US" dirty="0">
+                <a:latin typeface="Consolas" panose="020B0609020204030204" pitchFamily="49" charset="0"/>
+                <a:cs typeface="Consolas" panose="020B0609020204030204" pitchFamily="49" charset="0"/>
+              </a:rPr>
+              <a:t>root</a:t>
+            </a:r>
+          </a:p>
+        </p:txBody>
+      </p:sp>
+      <p:sp>
+        <p:nvSpPr>
+          <p:cNvPr id="12" name="TextBox 11">
+            <a:extLst>
+              <a:ext uri="{FF2B5EF4-FFF2-40B4-BE49-F238E27FC236}">
+                <a16:creationId xmlns:a16="http://schemas.microsoft.com/office/drawing/2014/main" id="{113530FC-795D-3C3F-1A7C-5A299945A138}"/>
+              </a:ext>
+            </a:extLst>
+          </p:cNvPr>
+          <p:cNvSpPr txBox="1"/>
+          <p:nvPr/>
+        </p:nvSpPr>
+        <p:spPr>
+          <a:xfrm>
+            <a:off x="1490123" y="3420207"/>
+            <a:ext cx="1451038" cy="369332"/>
+          </a:xfrm>
+          <a:prstGeom prst="rect">
+            <a:avLst/>
+          </a:prstGeom>
+          <a:noFill/>
+        </p:spPr>
+        <p:txBody>
+          <a:bodyPr wrap="none" rtlCol="0">
+            <a:spAutoFit/>
+          </a:bodyPr>
+          <a:lstStyle/>
+          <a:p>
+            <a:r>
+              <a:rPr lang="en-US" dirty="0" err="1">
+                <a:latin typeface="Consolas" panose="020B0609020204030204" pitchFamily="49" charset="0"/>
+                <a:cs typeface="Consolas" panose="020B0609020204030204" pitchFamily="49" charset="0"/>
+              </a:rPr>
+              <a:t>it.current</a:t>
+            </a:r>
+            <a:endParaRPr lang="en-US" dirty="0">
+              <a:latin typeface="Consolas" panose="020B0609020204030204" pitchFamily="49" charset="0"/>
+              <a:cs typeface="Consolas" panose="020B0609020204030204" pitchFamily="49" charset="0"/>
+            </a:endParaRPr>
+          </a:p>
+        </p:txBody>
+      </p:sp>
+      <p:cxnSp>
+        <p:nvCxnSpPr>
+          <p:cNvPr id="16" name="Straight Arrow Connector 15">
+            <a:extLst>
+              <a:ext uri="{FF2B5EF4-FFF2-40B4-BE49-F238E27FC236}">
+                <a16:creationId xmlns:a16="http://schemas.microsoft.com/office/drawing/2014/main" id="{5D638263-FC0D-2025-2677-34CBD4524E7E}"/>
+              </a:ext>
+            </a:extLst>
+          </p:cNvPr>
+          <p:cNvCxnSpPr>
+            <a:stCxn id="10" idx="3"/>
+            <a:endCxn id="3" idx="2"/>
+          </p:cNvCxnSpPr>
+          <p:nvPr/>
+        </p:nvCxnSpPr>
+        <p:spPr>
+          <a:xfrm flipV="1">
+            <a:off x="4771048" y="2147888"/>
+            <a:ext cx="421836" cy="4712"/>
+          </a:xfrm>
+          <a:prstGeom prst="straightConnector1">
+            <a:avLst/>
+          </a:prstGeom>
+          <a:ln w="19050">
+            <a:tailEnd type="triangle"/>
+          </a:ln>
+        </p:spPr>
+        <p:style>
+          <a:lnRef idx="1">
+            <a:schemeClr val="accent1"/>
+          </a:lnRef>
+          <a:fillRef idx="0">
+            <a:schemeClr val="accent1"/>
+          </a:fillRef>
+          <a:effectRef idx="0">
+            <a:schemeClr val="accent1"/>
+          </a:effectRef>
+          <a:fontRef idx="minor">
+            <a:schemeClr val="tx1"/>
+          </a:fontRef>
+        </p:style>
+      </p:cxnSp>
+      <p:cxnSp>
+        <p:nvCxnSpPr>
+          <p:cNvPr id="19" name="Straight Arrow Connector 18">
+            <a:extLst>
+              <a:ext uri="{FF2B5EF4-FFF2-40B4-BE49-F238E27FC236}">
+                <a16:creationId xmlns:a16="http://schemas.microsoft.com/office/drawing/2014/main" id="{1AACEBA1-E0C8-46FC-EFE6-C41B0894517D}"/>
+              </a:ext>
+            </a:extLst>
+          </p:cNvPr>
+          <p:cNvCxnSpPr>
+            <a:stCxn id="12" idx="3"/>
+            <a:endCxn id="5" idx="2"/>
+          </p:cNvCxnSpPr>
+          <p:nvPr/>
+        </p:nvCxnSpPr>
+        <p:spPr>
+          <a:xfrm>
+            <a:off x="2941161" y="3604873"/>
+            <a:ext cx="422923" cy="0"/>
+          </a:xfrm>
+          <a:prstGeom prst="straightConnector1">
+            <a:avLst/>
+          </a:prstGeom>
+          <a:ln w="19050">
+            <a:tailEnd type="triangle"/>
+          </a:ln>
+        </p:spPr>
+        <p:style>
+          <a:lnRef idx="1">
+            <a:schemeClr val="accent1"/>
+          </a:lnRef>
+          <a:fillRef idx="0">
+            <a:schemeClr val="accent1"/>
+          </a:fillRef>
+          <a:effectRef idx="0">
+            <a:schemeClr val="accent1"/>
+          </a:effectRef>
+          <a:fontRef idx="minor">
+            <a:schemeClr val="tx1"/>
+          </a:fontRef>
+        </p:style>
+      </p:cxnSp>
+    </p:spTree>
+    <p:extLst>
+      <p:ext uri="{BB962C8B-B14F-4D97-AF65-F5344CB8AC3E}">
+        <p14:creationId xmlns:p14="http://schemas.microsoft.com/office/powerpoint/2010/main" val="2600402883"/>
+      </p:ext>
+    </p:extLst>
+  </p:cSld>
+  <p:clrMapOvr>
+    <a:masterClrMapping/>
+  </p:clrMapOvr>
+</p:sld>
+</file>
+
+<file path=ppt/slides/slide21.xml><?xml version="1.0" encoding="utf-8"?>
+<p:sld xmlns:a="http://schemas.openxmlformats.org/drawingml/2006/main" xmlns:r="http://schemas.openxmlformats.org/officeDocument/2006/relationships" xmlns:p="http://schemas.openxmlformats.org/presentationml/2006/main">
+  <p:cSld>
+    <p:spTree>
+      <p:nvGrpSpPr>
+        <p:cNvPr id="1" name=""/>
+        <p:cNvGrpSpPr/>
+        <p:nvPr/>
+      </p:nvGrpSpPr>
+      <p:grpSpPr>
+        <a:xfrm>
+          <a:off x="0" y="0"/>
+          <a:ext cx="0" cy="0"/>
+          <a:chOff x="0" y="0"/>
+          <a:chExt cx="0" cy="0"/>
+        </a:xfrm>
+      </p:grpSpPr>
+      <p:sp>
+        <p:nvSpPr>
+          <p:cNvPr id="2" name="Title 1">
+            <a:extLst>
+              <a:ext uri="{FF2B5EF4-FFF2-40B4-BE49-F238E27FC236}">
+                <a16:creationId xmlns:a16="http://schemas.microsoft.com/office/drawing/2014/main" id="{25002CE1-DF8E-E048-AD7B-4672929EE371}"/>
+              </a:ext>
+            </a:extLst>
+          </p:cNvPr>
+          <p:cNvSpPr>
+            <a:spLocks noGrp="1"/>
+          </p:cNvSpPr>
+          <p:nvPr>
+            <p:ph type="title"/>
+          </p:nvPr>
+        </p:nvSpPr>
+        <p:spPr/>
+        <p:txBody>
+          <a:bodyPr/>
+          <a:lstStyle/>
+          <a:p>
+            <a:r>
+              <a:rPr lang="en-US" dirty="0"/>
+              <a:t>Tree After Root Destroyed</a:t>
+            </a:r>
+          </a:p>
+        </p:txBody>
+      </p:sp>
+      <p:sp>
+        <p:nvSpPr>
+          <p:cNvPr id="5" name="Oval 4">
+            <a:extLst>
+              <a:ext uri="{FF2B5EF4-FFF2-40B4-BE49-F238E27FC236}">
+                <a16:creationId xmlns:a16="http://schemas.microsoft.com/office/drawing/2014/main" id="{5DD97348-82DA-A815-463D-95CA2F74DD4C}"/>
+              </a:ext>
+            </a:extLst>
+          </p:cNvPr>
+          <p:cNvSpPr/>
+          <p:nvPr/>
+        </p:nvSpPr>
+        <p:spPr>
+          <a:xfrm>
+            <a:off x="3364084" y="3147673"/>
+            <a:ext cx="914400" cy="914400"/>
+          </a:xfrm>
+          <a:prstGeom prst="ellipse">
+            <a:avLst/>
+          </a:prstGeom>
+        </p:spPr>
+        <p:style>
+          <a:lnRef idx="2">
+            <a:schemeClr val="accent1">
+              <a:shade val="15000"/>
+            </a:schemeClr>
+          </a:lnRef>
+          <a:fillRef idx="1">
+            <a:schemeClr val="accent1"/>
+          </a:fillRef>
+          <a:effectRef idx="0">
+            <a:schemeClr val="accent1"/>
+          </a:effectRef>
+          <a:fontRef idx="minor">
+            <a:schemeClr val="lt1"/>
+          </a:fontRef>
+        </p:style>
+        <p:txBody>
+          <a:bodyPr rtlCol="0" anchor="ctr"/>
+          <a:lstStyle/>
+          <a:p>
+            <a:pPr algn="ctr"/>
+            <a:r>
+              <a:rPr lang="en-US" dirty="0"/>
+              <a:t>5</a:t>
+            </a:r>
+          </a:p>
+        </p:txBody>
+      </p:sp>
+      <p:sp>
+        <p:nvSpPr>
+          <p:cNvPr id="6" name="Oval 5">
+            <a:extLst>
+              <a:ext uri="{FF2B5EF4-FFF2-40B4-BE49-F238E27FC236}">
+                <a16:creationId xmlns:a16="http://schemas.microsoft.com/office/drawing/2014/main" id="{8AB52635-DBC7-5070-1229-A27BAB703053}"/>
+              </a:ext>
+            </a:extLst>
+          </p:cNvPr>
+          <p:cNvSpPr/>
+          <p:nvPr/>
+        </p:nvSpPr>
+        <p:spPr>
+          <a:xfrm>
+            <a:off x="2215642" y="4715216"/>
+            <a:ext cx="914400" cy="914400"/>
+          </a:xfrm>
+          <a:prstGeom prst="ellipse">
+            <a:avLst/>
+          </a:prstGeom>
+        </p:spPr>
+        <p:style>
+          <a:lnRef idx="2">
+            <a:schemeClr val="accent1">
+              <a:shade val="15000"/>
+            </a:schemeClr>
+          </a:lnRef>
+          <a:fillRef idx="1">
+            <a:schemeClr val="accent1"/>
+          </a:fillRef>
+          <a:effectRef idx="0">
+            <a:schemeClr val="accent1"/>
+          </a:effectRef>
+          <a:fontRef idx="minor">
+            <a:schemeClr val="lt1"/>
+          </a:fontRef>
+        </p:style>
+        <p:txBody>
+          <a:bodyPr rtlCol="0" anchor="ctr"/>
+          <a:lstStyle/>
+          <a:p>
+            <a:pPr algn="ctr"/>
+            <a:r>
+              <a:rPr lang="en-US" dirty="0"/>
+              <a:t>2</a:t>
+            </a:r>
+          </a:p>
+        </p:txBody>
+      </p:sp>
+      <p:sp>
+        <p:nvSpPr>
+          <p:cNvPr id="7" name="Oval 6">
+            <a:extLst>
+              <a:ext uri="{FF2B5EF4-FFF2-40B4-BE49-F238E27FC236}">
+                <a16:creationId xmlns:a16="http://schemas.microsoft.com/office/drawing/2014/main" id="{6D72B71E-BB44-F6D3-E57A-0D469912A251}"/>
+              </a:ext>
+            </a:extLst>
+          </p:cNvPr>
+          <p:cNvSpPr/>
+          <p:nvPr/>
+        </p:nvSpPr>
+        <p:spPr>
+          <a:xfrm>
+            <a:off x="4572398" y="4715216"/>
+            <a:ext cx="914400" cy="914400"/>
+          </a:xfrm>
+          <a:prstGeom prst="ellipse">
+            <a:avLst/>
+          </a:prstGeom>
+        </p:spPr>
+        <p:style>
+          <a:lnRef idx="2">
+            <a:schemeClr val="accent1">
+              <a:shade val="15000"/>
+            </a:schemeClr>
+          </a:lnRef>
+          <a:fillRef idx="1">
+            <a:schemeClr val="accent1"/>
+          </a:fillRef>
+          <a:effectRef idx="0">
+            <a:schemeClr val="accent1"/>
+          </a:effectRef>
+          <a:fontRef idx="minor">
+            <a:schemeClr val="lt1"/>
+          </a:fontRef>
+        </p:style>
+        <p:txBody>
+          <a:bodyPr rtlCol="0" anchor="ctr"/>
+          <a:lstStyle/>
+          <a:p>
+            <a:pPr algn="ctr"/>
+            <a:r>
+              <a:rPr lang="en-US" dirty="0"/>
+              <a:t>7</a:t>
+            </a:r>
+          </a:p>
+        </p:txBody>
+      </p:sp>
+      <p:cxnSp>
+        <p:nvCxnSpPr>
+          <p:cNvPr id="15" name="Straight Arrow Connector 14">
+            <a:extLst>
+              <a:ext uri="{FF2B5EF4-FFF2-40B4-BE49-F238E27FC236}">
+                <a16:creationId xmlns:a16="http://schemas.microsoft.com/office/drawing/2014/main" id="{2F3DCC4F-AA73-F190-5A71-CFB5CB14442D}"/>
+              </a:ext>
+            </a:extLst>
+          </p:cNvPr>
+          <p:cNvCxnSpPr>
+            <a:cxnSpLocks/>
+            <a:stCxn id="5" idx="3"/>
+            <a:endCxn id="6" idx="7"/>
+          </p:cNvCxnSpPr>
+          <p:nvPr/>
+        </p:nvCxnSpPr>
+        <p:spPr>
+          <a:xfrm flipH="1">
+            <a:off x="2996131" y="3928162"/>
+            <a:ext cx="501864" cy="920965"/>
+          </a:xfrm>
+          <a:prstGeom prst="straightConnector1">
+            <a:avLst/>
+          </a:prstGeom>
+          <a:ln w="19050">
+            <a:tailEnd type="triangle"/>
+          </a:ln>
+        </p:spPr>
+        <p:style>
+          <a:lnRef idx="1">
+            <a:schemeClr val="accent1"/>
+          </a:lnRef>
+          <a:fillRef idx="0">
+            <a:schemeClr val="accent1"/>
+          </a:fillRef>
+          <a:effectRef idx="0">
+            <a:schemeClr val="accent1"/>
+          </a:effectRef>
+          <a:fontRef idx="minor">
+            <a:schemeClr val="tx1"/>
+          </a:fontRef>
+        </p:style>
+      </p:cxnSp>
+      <p:cxnSp>
+        <p:nvCxnSpPr>
+          <p:cNvPr id="18" name="Straight Arrow Connector 17">
+            <a:extLst>
+              <a:ext uri="{FF2B5EF4-FFF2-40B4-BE49-F238E27FC236}">
+                <a16:creationId xmlns:a16="http://schemas.microsoft.com/office/drawing/2014/main" id="{5B74AFC9-72CE-109E-C241-8C4166BBF4F3}"/>
+              </a:ext>
+            </a:extLst>
+          </p:cNvPr>
+          <p:cNvCxnSpPr>
+            <a:cxnSpLocks/>
+            <a:stCxn id="5" idx="5"/>
+            <a:endCxn id="7" idx="1"/>
+          </p:cNvCxnSpPr>
+          <p:nvPr/>
+        </p:nvCxnSpPr>
+        <p:spPr>
+          <a:xfrm>
+            <a:off x="4144573" y="3928162"/>
+            <a:ext cx="561736" cy="920965"/>
+          </a:xfrm>
+          <a:prstGeom prst="straightConnector1">
+            <a:avLst/>
+          </a:prstGeom>
+          <a:ln w="19050">
+            <a:tailEnd type="triangle"/>
+          </a:ln>
+        </p:spPr>
+        <p:style>
+          <a:lnRef idx="1">
+            <a:schemeClr val="accent1"/>
+          </a:lnRef>
+          <a:fillRef idx="0">
+            <a:schemeClr val="accent1"/>
+          </a:fillRef>
+          <a:effectRef idx="0">
+            <a:schemeClr val="accent1"/>
+          </a:effectRef>
+          <a:fontRef idx="minor">
+            <a:schemeClr val="tx1"/>
+          </a:fontRef>
+        </p:style>
+      </p:cxnSp>
+      <p:sp>
+        <p:nvSpPr>
+          <p:cNvPr id="12" name="TextBox 11">
+            <a:extLst>
+              <a:ext uri="{FF2B5EF4-FFF2-40B4-BE49-F238E27FC236}">
+                <a16:creationId xmlns:a16="http://schemas.microsoft.com/office/drawing/2014/main" id="{113530FC-795D-3C3F-1A7C-5A299945A138}"/>
+              </a:ext>
+            </a:extLst>
+          </p:cNvPr>
+          <p:cNvSpPr txBox="1"/>
+          <p:nvPr/>
+        </p:nvSpPr>
+        <p:spPr>
+          <a:xfrm>
+            <a:off x="1490123" y="3420207"/>
+            <a:ext cx="1451038" cy="369332"/>
+          </a:xfrm>
+          <a:prstGeom prst="rect">
+            <a:avLst/>
+          </a:prstGeom>
+          <a:noFill/>
+        </p:spPr>
+        <p:txBody>
+          <a:bodyPr wrap="none" rtlCol="0">
+            <a:spAutoFit/>
+          </a:bodyPr>
+          <a:lstStyle/>
+          <a:p>
+            <a:r>
+              <a:rPr lang="en-US" dirty="0" err="1">
+                <a:latin typeface="Consolas" panose="020B0609020204030204" pitchFamily="49" charset="0"/>
+                <a:cs typeface="Consolas" panose="020B0609020204030204" pitchFamily="49" charset="0"/>
+              </a:rPr>
+              <a:t>it.current</a:t>
+            </a:r>
+            <a:endParaRPr lang="en-US" dirty="0">
+              <a:latin typeface="Consolas" panose="020B0609020204030204" pitchFamily="49" charset="0"/>
+              <a:cs typeface="Consolas" panose="020B0609020204030204" pitchFamily="49" charset="0"/>
+            </a:endParaRPr>
+          </a:p>
+        </p:txBody>
+      </p:sp>
+      <p:cxnSp>
+        <p:nvCxnSpPr>
+          <p:cNvPr id="19" name="Straight Arrow Connector 18">
+            <a:extLst>
+              <a:ext uri="{FF2B5EF4-FFF2-40B4-BE49-F238E27FC236}">
+                <a16:creationId xmlns:a16="http://schemas.microsoft.com/office/drawing/2014/main" id="{1AACEBA1-E0C8-46FC-EFE6-C41B0894517D}"/>
+              </a:ext>
+            </a:extLst>
+          </p:cNvPr>
+          <p:cNvCxnSpPr>
+            <a:stCxn id="12" idx="3"/>
+            <a:endCxn id="5" idx="2"/>
+          </p:cNvCxnSpPr>
+          <p:nvPr/>
+        </p:nvCxnSpPr>
+        <p:spPr>
+          <a:xfrm>
+            <a:off x="2941161" y="3604873"/>
+            <a:ext cx="422923" cy="0"/>
+          </a:xfrm>
+          <a:prstGeom prst="straightConnector1">
+            <a:avLst/>
+          </a:prstGeom>
+          <a:ln w="19050">
+            <a:tailEnd type="triangle"/>
+          </a:ln>
+        </p:spPr>
+        <p:style>
+          <a:lnRef idx="1">
+            <a:schemeClr val="accent1"/>
+          </a:lnRef>
+          <a:fillRef idx="0">
+            <a:schemeClr val="accent1"/>
+          </a:fillRef>
+          <a:effectRef idx="0">
+            <a:schemeClr val="accent1"/>
+          </a:effectRef>
+          <a:fontRef idx="minor">
+            <a:schemeClr val="tx1"/>
+          </a:fontRef>
+        </p:style>
+      </p:cxnSp>
+      <p:sp>
+        <p:nvSpPr>
+          <p:cNvPr id="14" name="TextBox 13">
+            <a:extLst>
+              <a:ext uri="{FF2B5EF4-FFF2-40B4-BE49-F238E27FC236}">
+                <a16:creationId xmlns:a16="http://schemas.microsoft.com/office/drawing/2014/main" id="{0CFCB357-8793-586F-70C9-1202626A1BBC}"/>
+              </a:ext>
+            </a:extLst>
+          </p:cNvPr>
+          <p:cNvSpPr txBox="1"/>
+          <p:nvPr/>
+        </p:nvSpPr>
+        <p:spPr>
+          <a:xfrm>
+            <a:off x="6293298" y="2681543"/>
+            <a:ext cx="4513159" cy="923330"/>
+          </a:xfrm>
+          <a:prstGeom prst="rect">
+            <a:avLst/>
+          </a:prstGeom>
+          <a:noFill/>
+        </p:spPr>
+        <p:txBody>
+          <a:bodyPr wrap="none" rtlCol="0">
+            <a:spAutoFit/>
+          </a:bodyPr>
+          <a:lstStyle/>
+          <a:p>
+            <a:r>
+              <a:rPr lang="en-US" dirty="0"/>
+              <a:t>The node “5” continues to exist because there</a:t>
+            </a:r>
+          </a:p>
+          <a:p>
+            <a:r>
+              <a:rPr lang="en-US" dirty="0"/>
+              <a:t>is another smart pointer in the iterator that</a:t>
+            </a:r>
+          </a:p>
+          <a:p>
+            <a:r>
+              <a:rPr lang="en-US" dirty="0"/>
+              <a:t>points at it.</a:t>
+            </a:r>
+          </a:p>
+        </p:txBody>
+      </p:sp>
+    </p:spTree>
+    <p:extLst>
+      <p:ext uri="{BB962C8B-B14F-4D97-AF65-F5344CB8AC3E}">
+        <p14:creationId xmlns:p14="http://schemas.microsoft.com/office/powerpoint/2010/main" val="3512199349"/>
+      </p:ext>
+    </p:extLst>
+  </p:cSld>
+  <p:clrMapOvr>
+    <a:masterClrMapping/>
+  </p:clrMapOvr>
+</p:sld>
+</file>
+
+<file path=ppt/slides/slide22.xml><?xml version="1.0" encoding="utf-8"?>
+<p:sld xmlns:a="http://schemas.openxmlformats.org/drawingml/2006/main" xmlns:r="http://schemas.openxmlformats.org/officeDocument/2006/relationships" xmlns:p="http://schemas.openxmlformats.org/presentationml/2006/main">
+  <p:cSld>
+    <p:spTree>
+      <p:nvGrpSpPr>
+        <p:cNvPr id="1" name=""/>
+        <p:cNvGrpSpPr/>
+        <p:nvPr/>
+      </p:nvGrpSpPr>
+      <p:grpSpPr>
+        <a:xfrm>
+          <a:off x="0" y="0"/>
+          <a:ext cx="0" cy="0"/>
+          <a:chOff x="0" y="0"/>
+          <a:chExt cx="0" cy="0"/>
+        </a:xfrm>
+      </p:grpSpPr>
+      <p:sp>
+        <p:nvSpPr>
+          <p:cNvPr id="2" name="Title 1">
+            <a:extLst>
+              <a:ext uri="{FF2B5EF4-FFF2-40B4-BE49-F238E27FC236}">
+                <a16:creationId xmlns:a16="http://schemas.microsoft.com/office/drawing/2014/main" id="{25002CE1-DF8E-E048-AD7B-4672929EE371}"/>
+              </a:ext>
+            </a:extLst>
+          </p:cNvPr>
+          <p:cNvSpPr>
+            <a:spLocks noGrp="1"/>
+          </p:cNvSpPr>
+          <p:nvPr>
+            <p:ph type="title"/>
+          </p:nvPr>
+        </p:nvSpPr>
+        <p:spPr/>
+        <p:txBody>
+          <a:bodyPr/>
+          <a:lstStyle/>
+          <a:p>
+            <a:r>
+              <a:rPr lang="en-US" dirty="0"/>
+              <a:t>Tree After Iterator Moved</a:t>
+            </a:r>
+          </a:p>
+        </p:txBody>
+      </p:sp>
+      <p:sp>
+        <p:nvSpPr>
+          <p:cNvPr id="5" name="Oval 4">
+            <a:extLst>
+              <a:ext uri="{FF2B5EF4-FFF2-40B4-BE49-F238E27FC236}">
+                <a16:creationId xmlns:a16="http://schemas.microsoft.com/office/drawing/2014/main" id="{5DD97348-82DA-A815-463D-95CA2F74DD4C}"/>
+              </a:ext>
+            </a:extLst>
+          </p:cNvPr>
+          <p:cNvSpPr/>
+          <p:nvPr/>
+        </p:nvSpPr>
+        <p:spPr>
+          <a:xfrm>
+            <a:off x="3364084" y="3147673"/>
+            <a:ext cx="914400" cy="914400"/>
+          </a:xfrm>
+          <a:prstGeom prst="ellipse">
+            <a:avLst/>
+          </a:prstGeom>
+        </p:spPr>
+        <p:style>
+          <a:lnRef idx="2">
+            <a:schemeClr val="accent1">
+              <a:shade val="15000"/>
+            </a:schemeClr>
+          </a:lnRef>
+          <a:fillRef idx="1">
+            <a:schemeClr val="accent1"/>
+          </a:fillRef>
+          <a:effectRef idx="0">
+            <a:schemeClr val="accent1"/>
+          </a:effectRef>
+          <a:fontRef idx="minor">
+            <a:schemeClr val="lt1"/>
+          </a:fontRef>
+        </p:style>
+        <p:txBody>
+          <a:bodyPr rtlCol="0" anchor="ctr"/>
+          <a:lstStyle/>
+          <a:p>
+            <a:pPr algn="ctr"/>
+            <a:r>
+              <a:rPr lang="en-US" dirty="0"/>
+              <a:t>5</a:t>
+            </a:r>
+          </a:p>
+        </p:txBody>
+      </p:sp>
+      <p:sp>
+        <p:nvSpPr>
+          <p:cNvPr id="6" name="Oval 5">
+            <a:extLst>
+              <a:ext uri="{FF2B5EF4-FFF2-40B4-BE49-F238E27FC236}">
+                <a16:creationId xmlns:a16="http://schemas.microsoft.com/office/drawing/2014/main" id="{8AB52635-DBC7-5070-1229-A27BAB703053}"/>
+              </a:ext>
+            </a:extLst>
+          </p:cNvPr>
+          <p:cNvSpPr/>
+          <p:nvPr/>
+        </p:nvSpPr>
+        <p:spPr>
+          <a:xfrm>
+            <a:off x="2215642" y="4715216"/>
+            <a:ext cx="914400" cy="914400"/>
+          </a:xfrm>
+          <a:prstGeom prst="ellipse">
+            <a:avLst/>
+          </a:prstGeom>
+        </p:spPr>
+        <p:style>
+          <a:lnRef idx="2">
+            <a:schemeClr val="accent1">
+              <a:shade val="15000"/>
+            </a:schemeClr>
+          </a:lnRef>
+          <a:fillRef idx="1">
+            <a:schemeClr val="accent1"/>
+          </a:fillRef>
+          <a:effectRef idx="0">
+            <a:schemeClr val="accent1"/>
+          </a:effectRef>
+          <a:fontRef idx="minor">
+            <a:schemeClr val="lt1"/>
+          </a:fontRef>
+        </p:style>
+        <p:txBody>
+          <a:bodyPr rtlCol="0" anchor="ctr"/>
+          <a:lstStyle/>
+          <a:p>
+            <a:pPr algn="ctr"/>
+            <a:r>
+              <a:rPr lang="en-US" dirty="0"/>
+              <a:t>2</a:t>
+            </a:r>
+          </a:p>
+        </p:txBody>
+      </p:sp>
+      <p:sp>
+        <p:nvSpPr>
+          <p:cNvPr id="7" name="Oval 6">
+            <a:extLst>
+              <a:ext uri="{FF2B5EF4-FFF2-40B4-BE49-F238E27FC236}">
+                <a16:creationId xmlns:a16="http://schemas.microsoft.com/office/drawing/2014/main" id="{6D72B71E-BB44-F6D3-E57A-0D469912A251}"/>
+              </a:ext>
+            </a:extLst>
+          </p:cNvPr>
+          <p:cNvSpPr/>
+          <p:nvPr/>
+        </p:nvSpPr>
+        <p:spPr>
+          <a:xfrm>
+            <a:off x="4572398" y="4715216"/>
+            <a:ext cx="914400" cy="914400"/>
+          </a:xfrm>
+          <a:prstGeom prst="ellipse">
+            <a:avLst/>
+          </a:prstGeom>
+        </p:spPr>
+        <p:style>
+          <a:lnRef idx="2">
+            <a:schemeClr val="accent1">
+              <a:shade val="15000"/>
+            </a:schemeClr>
+          </a:lnRef>
+          <a:fillRef idx="1">
+            <a:schemeClr val="accent1"/>
+          </a:fillRef>
+          <a:effectRef idx="0">
+            <a:schemeClr val="accent1"/>
+          </a:effectRef>
+          <a:fontRef idx="minor">
+            <a:schemeClr val="lt1"/>
+          </a:fontRef>
+        </p:style>
+        <p:txBody>
+          <a:bodyPr rtlCol="0" anchor="ctr"/>
+          <a:lstStyle/>
+          <a:p>
+            <a:pPr algn="ctr"/>
+            <a:r>
+              <a:rPr lang="en-US" dirty="0"/>
+              <a:t>7</a:t>
+            </a:r>
+          </a:p>
+        </p:txBody>
+      </p:sp>
+      <p:cxnSp>
+        <p:nvCxnSpPr>
+          <p:cNvPr id="15" name="Straight Arrow Connector 14">
+            <a:extLst>
+              <a:ext uri="{FF2B5EF4-FFF2-40B4-BE49-F238E27FC236}">
+                <a16:creationId xmlns:a16="http://schemas.microsoft.com/office/drawing/2014/main" id="{2F3DCC4F-AA73-F190-5A71-CFB5CB14442D}"/>
+              </a:ext>
+            </a:extLst>
+          </p:cNvPr>
+          <p:cNvCxnSpPr>
+            <a:cxnSpLocks/>
+            <a:stCxn id="5" idx="3"/>
+            <a:endCxn id="6" idx="7"/>
+          </p:cNvCxnSpPr>
+          <p:nvPr/>
+        </p:nvCxnSpPr>
+        <p:spPr>
+          <a:xfrm flipH="1">
+            <a:off x="2996131" y="3928162"/>
+            <a:ext cx="501864" cy="920965"/>
+          </a:xfrm>
+          <a:prstGeom prst="straightConnector1">
+            <a:avLst/>
+          </a:prstGeom>
+          <a:ln w="19050">
+            <a:tailEnd type="triangle"/>
+          </a:ln>
+        </p:spPr>
+        <p:style>
+          <a:lnRef idx="1">
+            <a:schemeClr val="accent1"/>
+          </a:lnRef>
+          <a:fillRef idx="0">
+            <a:schemeClr val="accent1"/>
+          </a:fillRef>
+          <a:effectRef idx="0">
+            <a:schemeClr val="accent1"/>
+          </a:effectRef>
+          <a:fontRef idx="minor">
+            <a:schemeClr val="tx1"/>
+          </a:fontRef>
+        </p:style>
+      </p:cxnSp>
+      <p:cxnSp>
+        <p:nvCxnSpPr>
+          <p:cNvPr id="18" name="Straight Arrow Connector 17">
+            <a:extLst>
+              <a:ext uri="{FF2B5EF4-FFF2-40B4-BE49-F238E27FC236}">
+                <a16:creationId xmlns:a16="http://schemas.microsoft.com/office/drawing/2014/main" id="{5B74AFC9-72CE-109E-C241-8C4166BBF4F3}"/>
+              </a:ext>
+            </a:extLst>
+          </p:cNvPr>
+          <p:cNvCxnSpPr>
+            <a:cxnSpLocks/>
+            <a:stCxn id="5" idx="5"/>
+            <a:endCxn id="7" idx="1"/>
+          </p:cNvCxnSpPr>
+          <p:nvPr/>
+        </p:nvCxnSpPr>
+        <p:spPr>
+          <a:xfrm>
+            <a:off x="4144573" y="3928162"/>
+            <a:ext cx="561736" cy="920965"/>
+          </a:xfrm>
+          <a:prstGeom prst="straightConnector1">
+            <a:avLst/>
+          </a:prstGeom>
+          <a:ln w="19050">
+            <a:tailEnd type="triangle"/>
+          </a:ln>
+        </p:spPr>
+        <p:style>
+          <a:lnRef idx="1">
+            <a:schemeClr val="accent1"/>
+          </a:lnRef>
+          <a:fillRef idx="0">
+            <a:schemeClr val="accent1"/>
+          </a:fillRef>
+          <a:effectRef idx="0">
+            <a:schemeClr val="accent1"/>
+          </a:effectRef>
+          <a:fontRef idx="minor">
+            <a:schemeClr val="tx1"/>
+          </a:fontRef>
+        </p:style>
+      </p:cxnSp>
+      <p:sp>
+        <p:nvSpPr>
+          <p:cNvPr id="12" name="TextBox 11">
+            <a:extLst>
+              <a:ext uri="{FF2B5EF4-FFF2-40B4-BE49-F238E27FC236}">
+                <a16:creationId xmlns:a16="http://schemas.microsoft.com/office/drawing/2014/main" id="{113530FC-795D-3C3F-1A7C-5A299945A138}"/>
+              </a:ext>
+            </a:extLst>
+          </p:cNvPr>
+          <p:cNvSpPr txBox="1"/>
+          <p:nvPr/>
+        </p:nvSpPr>
+        <p:spPr>
+          <a:xfrm>
+            <a:off x="6293298" y="4987750"/>
+            <a:ext cx="1451038" cy="369332"/>
+          </a:xfrm>
+          <a:prstGeom prst="rect">
+            <a:avLst/>
+          </a:prstGeom>
+          <a:noFill/>
+        </p:spPr>
+        <p:txBody>
+          <a:bodyPr wrap="none" rtlCol="0">
+            <a:spAutoFit/>
+          </a:bodyPr>
+          <a:lstStyle/>
+          <a:p>
+            <a:r>
+              <a:rPr lang="en-US" dirty="0" err="1">
+                <a:latin typeface="Consolas" panose="020B0609020204030204" pitchFamily="49" charset="0"/>
+                <a:cs typeface="Consolas" panose="020B0609020204030204" pitchFamily="49" charset="0"/>
+              </a:rPr>
+              <a:t>it.current</a:t>
+            </a:r>
+            <a:endParaRPr lang="en-US" dirty="0">
+              <a:latin typeface="Consolas" panose="020B0609020204030204" pitchFamily="49" charset="0"/>
+              <a:cs typeface="Consolas" panose="020B0609020204030204" pitchFamily="49" charset="0"/>
+            </a:endParaRPr>
+          </a:p>
+        </p:txBody>
+      </p:sp>
+      <p:cxnSp>
+        <p:nvCxnSpPr>
+          <p:cNvPr id="19" name="Straight Arrow Connector 18">
+            <a:extLst>
+              <a:ext uri="{FF2B5EF4-FFF2-40B4-BE49-F238E27FC236}">
+                <a16:creationId xmlns:a16="http://schemas.microsoft.com/office/drawing/2014/main" id="{1AACEBA1-E0C8-46FC-EFE6-C41B0894517D}"/>
+              </a:ext>
+            </a:extLst>
+          </p:cNvPr>
+          <p:cNvCxnSpPr>
+            <a:cxnSpLocks/>
+            <a:stCxn id="12" idx="1"/>
+            <a:endCxn id="7" idx="6"/>
+          </p:cNvCxnSpPr>
+          <p:nvPr/>
+        </p:nvCxnSpPr>
+        <p:spPr>
+          <a:xfrm flipH="1">
+            <a:off x="5486798" y="5172416"/>
+            <a:ext cx="806500" cy="0"/>
+          </a:xfrm>
+          <a:prstGeom prst="straightConnector1">
+            <a:avLst/>
+          </a:prstGeom>
+          <a:ln w="19050">
+            <a:tailEnd type="triangle"/>
+          </a:ln>
+        </p:spPr>
+        <p:style>
+          <a:lnRef idx="1">
+            <a:schemeClr val="accent1"/>
+          </a:lnRef>
+          <a:fillRef idx="0">
+            <a:schemeClr val="accent1"/>
+          </a:fillRef>
+          <a:effectRef idx="0">
+            <a:schemeClr val="accent1"/>
+          </a:effectRef>
+          <a:fontRef idx="minor">
+            <a:schemeClr val="tx1"/>
+          </a:fontRef>
+        </p:style>
+      </p:cxnSp>
+      <p:sp>
+        <p:nvSpPr>
+          <p:cNvPr id="14" name="TextBox 13">
+            <a:extLst>
+              <a:ext uri="{FF2B5EF4-FFF2-40B4-BE49-F238E27FC236}">
+                <a16:creationId xmlns:a16="http://schemas.microsoft.com/office/drawing/2014/main" id="{0CFCB357-8793-586F-70C9-1202626A1BBC}"/>
+              </a:ext>
+            </a:extLst>
+          </p:cNvPr>
+          <p:cNvSpPr txBox="1"/>
+          <p:nvPr/>
+        </p:nvSpPr>
+        <p:spPr>
+          <a:xfrm>
+            <a:off x="6293298" y="2681543"/>
+            <a:ext cx="4513159" cy="923330"/>
+          </a:xfrm>
+          <a:prstGeom prst="rect">
+            <a:avLst/>
+          </a:prstGeom>
+          <a:noFill/>
+        </p:spPr>
+        <p:txBody>
+          <a:bodyPr wrap="none" rtlCol="0">
+            <a:spAutoFit/>
+          </a:bodyPr>
+          <a:lstStyle/>
+          <a:p>
+            <a:r>
+              <a:rPr lang="en-US" dirty="0"/>
+              <a:t>The node “5” continues to exist because there</a:t>
+            </a:r>
+          </a:p>
+          <a:p>
+            <a:r>
+              <a:rPr lang="en-US" dirty="0"/>
+              <a:t>is another smart pointer in the iterator that</a:t>
+            </a:r>
+          </a:p>
+          <a:p>
+            <a:r>
+              <a:rPr lang="en-US" dirty="0"/>
+              <a:t>points at it.</a:t>
+            </a:r>
+          </a:p>
+        </p:txBody>
+      </p:sp>
+    </p:spTree>
+    <p:extLst>
+      <p:ext uri="{BB962C8B-B14F-4D97-AF65-F5344CB8AC3E}">
+        <p14:creationId xmlns:p14="http://schemas.microsoft.com/office/powerpoint/2010/main" val="2168863984"/>
+      </p:ext>
+    </p:extLst>
+  </p:cSld>
+  <p:clrMapOvr>
+    <a:masterClrMapping/>
+  </p:clrMapOvr>
+</p:sld>
+</file>
+
+<file path=ppt/slides/slide23.xml><?xml version="1.0" encoding="utf-8"?>
+<p:sld xmlns:a="http://schemas.openxmlformats.org/drawingml/2006/main" xmlns:r="http://schemas.openxmlformats.org/officeDocument/2006/relationships" xmlns:p="http://schemas.openxmlformats.org/presentationml/2006/main">
+  <p:cSld>
+    <p:spTree>
+      <p:nvGrpSpPr>
+        <p:cNvPr id="1" name=""/>
+        <p:cNvGrpSpPr/>
+        <p:nvPr/>
+      </p:nvGrpSpPr>
+      <p:grpSpPr>
+        <a:xfrm>
+          <a:off x="0" y="0"/>
+          <a:ext cx="0" cy="0"/>
+          <a:chOff x="0" y="0"/>
+          <a:chExt cx="0" cy="0"/>
+        </a:xfrm>
+      </p:grpSpPr>
+      <p:sp>
+        <p:nvSpPr>
+          <p:cNvPr id="2" name="Title 1">
+            <a:extLst>
+              <a:ext uri="{FF2B5EF4-FFF2-40B4-BE49-F238E27FC236}">
+                <a16:creationId xmlns:a16="http://schemas.microsoft.com/office/drawing/2014/main" id="{25002CE1-DF8E-E048-AD7B-4672929EE371}"/>
+              </a:ext>
+            </a:extLst>
+          </p:cNvPr>
+          <p:cNvSpPr>
+            <a:spLocks noGrp="1"/>
+          </p:cNvSpPr>
+          <p:nvPr>
+            <p:ph type="title"/>
+          </p:nvPr>
+        </p:nvSpPr>
+        <p:spPr/>
+        <p:txBody>
+          <a:bodyPr/>
+          <a:lstStyle/>
+          <a:p>
+            <a:r>
+              <a:rPr lang="en-US" dirty="0"/>
+              <a:t>Tree After Iterator Destroyed</a:t>
+            </a:r>
+          </a:p>
+        </p:txBody>
+      </p:sp>
+      <p:sp>
+        <p:nvSpPr>
+          <p:cNvPr id="5" name="Oval 4">
+            <a:extLst>
+              <a:ext uri="{FF2B5EF4-FFF2-40B4-BE49-F238E27FC236}">
+                <a16:creationId xmlns:a16="http://schemas.microsoft.com/office/drawing/2014/main" id="{5DD97348-82DA-A815-463D-95CA2F74DD4C}"/>
+              </a:ext>
+            </a:extLst>
+          </p:cNvPr>
+          <p:cNvSpPr/>
+          <p:nvPr/>
+        </p:nvSpPr>
+        <p:spPr>
+          <a:xfrm>
+            <a:off x="3364084" y="3147673"/>
+            <a:ext cx="914400" cy="914400"/>
+          </a:xfrm>
+          <a:prstGeom prst="ellipse">
+            <a:avLst/>
+          </a:prstGeom>
+        </p:spPr>
+        <p:style>
+          <a:lnRef idx="2">
+            <a:schemeClr val="accent1">
+              <a:shade val="15000"/>
+            </a:schemeClr>
+          </a:lnRef>
+          <a:fillRef idx="1">
+            <a:schemeClr val="accent1"/>
+          </a:fillRef>
+          <a:effectRef idx="0">
+            <a:schemeClr val="accent1"/>
+          </a:effectRef>
+          <a:fontRef idx="minor">
+            <a:schemeClr val="lt1"/>
+          </a:fontRef>
+        </p:style>
+        <p:txBody>
+          <a:bodyPr rtlCol="0" anchor="ctr"/>
+          <a:lstStyle/>
+          <a:p>
+            <a:pPr algn="ctr"/>
+            <a:r>
+              <a:rPr lang="en-US" dirty="0"/>
+              <a:t>5</a:t>
+            </a:r>
+          </a:p>
+        </p:txBody>
+      </p:sp>
+      <p:sp>
+        <p:nvSpPr>
+          <p:cNvPr id="6" name="Oval 5">
+            <a:extLst>
+              <a:ext uri="{FF2B5EF4-FFF2-40B4-BE49-F238E27FC236}">
+                <a16:creationId xmlns:a16="http://schemas.microsoft.com/office/drawing/2014/main" id="{8AB52635-DBC7-5070-1229-A27BAB703053}"/>
+              </a:ext>
+            </a:extLst>
+          </p:cNvPr>
+          <p:cNvSpPr/>
+          <p:nvPr/>
+        </p:nvSpPr>
+        <p:spPr>
+          <a:xfrm>
+            <a:off x="2215642" y="4715216"/>
+            <a:ext cx="914400" cy="914400"/>
+          </a:xfrm>
+          <a:prstGeom prst="ellipse">
+            <a:avLst/>
+          </a:prstGeom>
+        </p:spPr>
+        <p:style>
+          <a:lnRef idx="2">
+            <a:schemeClr val="accent1">
+              <a:shade val="15000"/>
+            </a:schemeClr>
+          </a:lnRef>
+          <a:fillRef idx="1">
+            <a:schemeClr val="accent1"/>
+          </a:fillRef>
+          <a:effectRef idx="0">
+            <a:schemeClr val="accent1"/>
+          </a:effectRef>
+          <a:fontRef idx="minor">
+            <a:schemeClr val="lt1"/>
+          </a:fontRef>
+        </p:style>
+        <p:txBody>
+          <a:bodyPr rtlCol="0" anchor="ctr"/>
+          <a:lstStyle/>
+          <a:p>
+            <a:pPr algn="ctr"/>
+            <a:r>
+              <a:rPr lang="en-US" dirty="0"/>
+              <a:t>2</a:t>
+            </a:r>
+          </a:p>
+        </p:txBody>
+      </p:sp>
+      <p:cxnSp>
+        <p:nvCxnSpPr>
+          <p:cNvPr id="15" name="Straight Arrow Connector 14">
+            <a:extLst>
+              <a:ext uri="{FF2B5EF4-FFF2-40B4-BE49-F238E27FC236}">
+                <a16:creationId xmlns:a16="http://schemas.microsoft.com/office/drawing/2014/main" id="{2F3DCC4F-AA73-F190-5A71-CFB5CB14442D}"/>
+              </a:ext>
+            </a:extLst>
+          </p:cNvPr>
+          <p:cNvCxnSpPr>
+            <a:cxnSpLocks/>
+            <a:stCxn id="5" idx="3"/>
+            <a:endCxn id="6" idx="7"/>
+          </p:cNvCxnSpPr>
+          <p:nvPr/>
+        </p:nvCxnSpPr>
+        <p:spPr>
+          <a:xfrm flipH="1">
+            <a:off x="2996131" y="3928162"/>
+            <a:ext cx="501864" cy="920965"/>
+          </a:xfrm>
+          <a:prstGeom prst="straightConnector1">
+            <a:avLst/>
+          </a:prstGeom>
+          <a:ln w="19050">
+            <a:tailEnd type="triangle"/>
+          </a:ln>
+        </p:spPr>
+        <p:style>
+          <a:lnRef idx="1">
+            <a:schemeClr val="accent1"/>
+          </a:lnRef>
+          <a:fillRef idx="0">
+            <a:schemeClr val="accent1"/>
+          </a:fillRef>
+          <a:effectRef idx="0">
+            <a:schemeClr val="accent1"/>
+          </a:effectRef>
+          <a:fontRef idx="minor">
+            <a:schemeClr val="tx1"/>
+          </a:fontRef>
+        </p:style>
+      </p:cxnSp>
+      <p:cxnSp>
+        <p:nvCxnSpPr>
+          <p:cNvPr id="18" name="Straight Arrow Connector 17">
+            <a:extLst>
+              <a:ext uri="{FF2B5EF4-FFF2-40B4-BE49-F238E27FC236}">
+                <a16:creationId xmlns:a16="http://schemas.microsoft.com/office/drawing/2014/main" id="{5B74AFC9-72CE-109E-C241-8C4166BBF4F3}"/>
+              </a:ext>
+            </a:extLst>
+          </p:cNvPr>
+          <p:cNvCxnSpPr>
+            <a:cxnSpLocks/>
+            <a:stCxn id="5" idx="5"/>
+          </p:cNvCxnSpPr>
+          <p:nvPr/>
+        </p:nvCxnSpPr>
+        <p:spPr>
+          <a:xfrm>
+            <a:off x="4144573" y="3928162"/>
+            <a:ext cx="561736" cy="920965"/>
+          </a:xfrm>
+          <a:prstGeom prst="straightConnector1">
+            <a:avLst/>
+          </a:prstGeom>
+          <a:ln w="19050">
+            <a:tailEnd type="triangle"/>
+          </a:ln>
+        </p:spPr>
+        <p:style>
+          <a:lnRef idx="1">
+            <a:schemeClr val="accent1"/>
+          </a:lnRef>
+          <a:fillRef idx="0">
+            <a:schemeClr val="accent1"/>
+          </a:fillRef>
+          <a:effectRef idx="0">
+            <a:schemeClr val="accent1"/>
+          </a:effectRef>
+          <a:fontRef idx="minor">
+            <a:schemeClr val="tx1"/>
+          </a:fontRef>
+        </p:style>
+      </p:cxnSp>
+      <p:sp>
+        <p:nvSpPr>
+          <p:cNvPr id="14" name="TextBox 13">
+            <a:extLst>
+              <a:ext uri="{FF2B5EF4-FFF2-40B4-BE49-F238E27FC236}">
+                <a16:creationId xmlns:a16="http://schemas.microsoft.com/office/drawing/2014/main" id="{0CFCB357-8793-586F-70C9-1202626A1BBC}"/>
+              </a:ext>
+            </a:extLst>
+          </p:cNvPr>
+          <p:cNvSpPr txBox="1"/>
+          <p:nvPr/>
+        </p:nvSpPr>
+        <p:spPr>
+          <a:xfrm>
+            <a:off x="6293298" y="2681543"/>
+            <a:ext cx="4634602" cy="1477328"/>
+          </a:xfrm>
+          <a:prstGeom prst="rect">
+            <a:avLst/>
+          </a:prstGeom>
+          <a:noFill/>
+        </p:spPr>
+        <p:txBody>
+          <a:bodyPr wrap="none" rtlCol="0">
+            <a:spAutoFit/>
+          </a:bodyPr>
+          <a:lstStyle/>
+          <a:p>
+            <a:r>
+              <a:rPr lang="en-US" dirty="0"/>
+              <a:t>Nodes “5” and “2” no longer have references.</a:t>
+            </a:r>
+          </a:p>
+          <a:p>
+            <a:r>
+              <a:rPr lang="en-US" i="1" dirty="0"/>
+              <a:t>Memory leak!</a:t>
+            </a:r>
+          </a:p>
+          <a:p>
+            <a:endParaRPr lang="en-US" dirty="0"/>
+          </a:p>
+          <a:p>
+            <a:r>
+              <a:rPr lang="en-US" dirty="0"/>
+              <a:t>Conclusion: </a:t>
+            </a:r>
+            <a:r>
+              <a:rPr lang="en-US" i="1" u="sng" dirty="0"/>
+              <a:t>Iterators remain valid after the tree</a:t>
+            </a:r>
+          </a:p>
+          <a:p>
+            <a:r>
+              <a:rPr lang="en-US" i="1" u="sng" dirty="0"/>
+              <a:t>Is destroyed, but do not move them!</a:t>
+            </a:r>
+          </a:p>
+        </p:txBody>
+      </p:sp>
+    </p:spTree>
+    <p:extLst>
+      <p:ext uri="{BB962C8B-B14F-4D97-AF65-F5344CB8AC3E}">
+        <p14:creationId xmlns:p14="http://schemas.microsoft.com/office/powerpoint/2010/main" val="1113868257"/>
+      </p:ext>
+    </p:extLst>
+  </p:cSld>
+  <p:clrMapOvr>
+    <a:masterClrMapping/>
+  </p:clrMapOvr>
+</p:sld>
+</file>
+
 <file path=ppt/slides/slide3.xml><?xml version="1.0" encoding="utf-8"?>
 <p:sld xmlns:a="http://schemas.openxmlformats.org/drawingml/2006/main" xmlns:r="http://schemas.openxmlformats.org/officeDocument/2006/relationships" xmlns:p="http://schemas.openxmlformats.org/presentationml/2006/main">
   <p:cSld>
@@ -9042,7 +11017,7 @@
           <a:prstGeom prst="straightConnector1">
             <a:avLst/>
           </a:prstGeom>
-          <a:ln>
+          <a:ln w="19050">
             <a:tailEnd type="triangle"/>
           </a:ln>
         </p:spPr>
@@ -9085,7 +11060,7 @@
           <a:prstGeom prst="straightConnector1">
             <a:avLst/>
           </a:prstGeom>
-          <a:ln>
+          <a:ln w="19050">
             <a:tailEnd type="triangle"/>
           </a:ln>
         </p:spPr>
@@ -9128,7 +11103,7 @@
           <a:prstGeom prst="straightConnector1">
             <a:avLst/>
           </a:prstGeom>
-          <a:ln>
+          <a:ln w="19050">
             <a:tailEnd type="triangle"/>
           </a:ln>
         </p:spPr>
@@ -9677,7 +11652,7 @@
           <a:prstGeom prst="straightConnector1">
             <a:avLst/>
           </a:prstGeom>
-          <a:ln>
+          <a:ln w="19050">
             <a:tailEnd type="triangle"/>
           </a:ln>
         </p:spPr>
@@ -9720,7 +11695,7 @@
           <a:prstGeom prst="straightConnector1">
             <a:avLst/>
           </a:prstGeom>
-          <a:ln>
+          <a:ln w="19050">
             <a:tailEnd type="triangle"/>
           </a:ln>
         </p:spPr>
@@ -9763,7 +11738,7 @@
           <a:prstGeom prst="straightConnector1">
             <a:avLst/>
           </a:prstGeom>
-          <a:ln>
+          <a:ln w="19050">
             <a:tailEnd type="triangle"/>
           </a:ln>
         </p:spPr>
@@ -9806,7 +11781,7 @@
           <a:prstGeom prst="straightConnector1">
             <a:avLst/>
           </a:prstGeom>
-          <a:ln>
+          <a:ln w="19050">
             <a:tailEnd type="triangle"/>
           </a:ln>
         </p:spPr>
@@ -9849,7 +11824,7 @@
           <a:prstGeom prst="straightConnector1">
             <a:avLst/>
           </a:prstGeom>
-          <a:ln>
+          <a:ln w="19050">
             <a:tailEnd type="triangle"/>
           </a:ln>
         </p:spPr>
@@ -9892,7 +11867,7 @@
           <a:prstGeom prst="straightConnector1">
             <a:avLst/>
           </a:prstGeom>
-          <a:ln>
+          <a:ln w="19050">
             <a:tailEnd type="triangle"/>
           </a:ln>
         </p:spPr>
@@ -10522,7 +12497,7 @@
           <a:prstGeom prst="straightConnector1">
             <a:avLst/>
           </a:prstGeom>
-          <a:ln>
+          <a:ln w="19050">
             <a:tailEnd type="triangle"/>
           </a:ln>
         </p:spPr>
@@ -10565,7 +12540,7 @@
           <a:prstGeom prst="straightConnector1">
             <a:avLst/>
           </a:prstGeom>
-          <a:ln>
+          <a:ln w="19050">
             <a:tailEnd type="triangle"/>
           </a:ln>
         </p:spPr>
@@ -10608,7 +12583,7 @@
           <a:prstGeom prst="straightConnector1">
             <a:avLst/>
           </a:prstGeom>
-          <a:ln>
+          <a:ln w="19050">
             <a:tailEnd type="triangle"/>
           </a:ln>
         </p:spPr>

</xml_diff>

<commit_message>
Minor correction to the last commit.
</commit_message>
<xml_diff>
--- a/SplayTree/SplayTrees.pptx
+++ b/SplayTree/SplayTrees.pptx
@@ -9155,7 +9155,7 @@
           <a:p>
             <a:r>
               <a:rPr lang="en-US" dirty="0"/>
-              <a:t>Tree After Iterator Moved</a:t>
+              <a:t>Tree After Iterator Is Incremented</a:t>
             </a:r>
           </a:p>
         </p:txBody>
@@ -9478,53 +9478,6 @@
           </a:fontRef>
         </p:style>
       </p:cxnSp>
-      <p:sp>
-        <p:nvSpPr>
-          <p:cNvPr id="14" name="TextBox 13">
-            <a:extLst>
-              <a:ext uri="{FF2B5EF4-FFF2-40B4-BE49-F238E27FC236}">
-                <a16:creationId xmlns:a16="http://schemas.microsoft.com/office/drawing/2014/main" id="{0CFCB357-8793-586F-70C9-1202626A1BBC}"/>
-              </a:ext>
-            </a:extLst>
-          </p:cNvPr>
-          <p:cNvSpPr txBox="1"/>
-          <p:nvPr/>
-        </p:nvSpPr>
-        <p:spPr>
-          <a:xfrm>
-            <a:off x="6293298" y="2681543"/>
-            <a:ext cx="4513159" cy="923330"/>
-          </a:xfrm>
-          <a:prstGeom prst="rect">
-            <a:avLst/>
-          </a:prstGeom>
-          <a:noFill/>
-        </p:spPr>
-        <p:txBody>
-          <a:bodyPr wrap="none" rtlCol="0">
-            <a:spAutoFit/>
-          </a:bodyPr>
-          <a:lstStyle/>
-          <a:p>
-            <a:r>
-              <a:rPr lang="en-US" dirty="0"/>
-              <a:t>The node “5” continues to exist because there</a:t>
-            </a:r>
-          </a:p>
-          <a:p>
-            <a:r>
-              <a:rPr lang="en-US" dirty="0"/>
-              <a:t>is another smart pointer in the iterator that</a:t>
-            </a:r>
-          </a:p>
-          <a:p>
-            <a:r>
-              <a:rPr lang="en-US" dirty="0"/>
-              <a:t>points at it.</a:t>
-            </a:r>
-          </a:p>
-        </p:txBody>
-      </p:sp>
     </p:spTree>
     <p:extLst>
       <p:ext uri="{BB962C8B-B14F-4D97-AF65-F5344CB8AC3E}">

</xml_diff>